<commit_message>
pt1 new-delete issues started as part of lecture 5
</commit_message>
<xml_diff>
--- a/pt1/lectures/lecture5/lecture5.pptx
+++ b/pt1/lectures/lecture5/lecture5.pptx
@@ -5,7 +5,7 @@
     <p:sldMasterId id="2147483660" r:id="rId1"/>
   </p:sldMasterIdLst>
   <p:notesMasterIdLst>
-    <p:notesMasterId r:id="rId13"/>
+    <p:notesMasterId r:id="rId18"/>
   </p:notesMasterIdLst>
   <p:sldIdLst>
     <p:sldId id="256" r:id="rId2"/>
@@ -19,6 +19,11 @@
     <p:sldId id="264" r:id="rId10"/>
     <p:sldId id="265" r:id="rId11"/>
     <p:sldId id="266" r:id="rId12"/>
+    <p:sldId id="267" r:id="rId13"/>
+    <p:sldId id="268" r:id="rId14"/>
+    <p:sldId id="271" r:id="rId15"/>
+    <p:sldId id="269" r:id="rId16"/>
+    <p:sldId id="270" r:id="rId17"/>
   </p:sldIdLst>
   <p:sldSz cx="12192000" cy="6858000"/>
   <p:notesSz cx="6858000" cy="9144000"/>
@@ -207,7 +212,7 @@
           <a:p>
             <a:fld id="{C68FF490-C393-40C0-9DBC-2C1AB355212D}" type="datetimeFigureOut">
               <a:rPr lang="en-US" smtClean="0"/>
-              <a:t>3/26/2021</a:t>
+              <a:t>4/22/2022</a:t>
             </a:fld>
             <a:endParaRPr lang="en-US"/>
           </a:p>
@@ -550,6 +555,90 @@
     <p:extLst>
       <p:ext uri="{BB962C8B-B14F-4D97-AF65-F5344CB8AC3E}">
         <p14:creationId xmlns:p14="http://schemas.microsoft.com/office/powerpoint/2010/main" val="3087679407"/>
+      </p:ext>
+    </p:extLst>
+  </p:cSld>
+  <p:clrMapOvr>
+    <a:masterClrMapping/>
+  </p:clrMapOvr>
+</p:notes>
+</file>
+
+<file path=ppt/notesSlides/notesSlide2.xml><?xml version="1.0" encoding="utf-8"?>
+<p:notes xmlns:a="http://schemas.openxmlformats.org/drawingml/2006/main" xmlns:r="http://schemas.openxmlformats.org/officeDocument/2006/relationships" xmlns:p="http://schemas.openxmlformats.org/presentationml/2006/main">
+  <p:cSld>
+    <p:spTree>
+      <p:nvGrpSpPr>
+        <p:cNvPr id="1" name=""/>
+        <p:cNvGrpSpPr/>
+        <p:nvPr/>
+      </p:nvGrpSpPr>
+      <p:grpSpPr>
+        <a:xfrm>
+          <a:off x="0" y="0"/>
+          <a:ext cx="0" cy="0"/>
+          <a:chOff x="0" y="0"/>
+          <a:chExt cx="0" cy="0"/>
+        </a:xfrm>
+      </p:grpSpPr>
+      <p:sp>
+        <p:nvSpPr>
+          <p:cNvPr id="2" name="Образ слайда 1"/>
+          <p:cNvSpPr>
+            <a:spLocks noGrp="1" noRot="1" noChangeAspect="1"/>
+          </p:cNvSpPr>
+          <p:nvPr>
+            <p:ph type="sldImg"/>
+          </p:nvPr>
+        </p:nvSpPr>
+        <p:spPr/>
+      </p:sp>
+      <p:sp>
+        <p:nvSpPr>
+          <p:cNvPr id="3" name="Заметки 2"/>
+          <p:cNvSpPr>
+            <a:spLocks noGrp="1"/>
+          </p:cNvSpPr>
+          <p:nvPr>
+            <p:ph type="body" idx="1"/>
+          </p:nvPr>
+        </p:nvSpPr>
+        <p:spPr/>
+        <p:txBody>
+          <a:bodyPr/>
+          <a:lstStyle/>
+          <a:p>
+            <a:endParaRPr lang="en-US" dirty="0"/>
+          </a:p>
+        </p:txBody>
+      </p:sp>
+      <p:sp>
+        <p:nvSpPr>
+          <p:cNvPr id="4" name="Номер слайда 3"/>
+          <p:cNvSpPr>
+            <a:spLocks noGrp="1"/>
+          </p:cNvSpPr>
+          <p:nvPr>
+            <p:ph type="sldNum" sz="quarter" idx="10"/>
+          </p:nvPr>
+        </p:nvSpPr>
+        <p:spPr/>
+        <p:txBody>
+          <a:bodyPr/>
+          <a:lstStyle/>
+          <a:p>
+            <a:fld id="{5E232540-7972-4844-A80F-A0E7778FE5B0}" type="slidenum">
+              <a:rPr lang="en-US" smtClean="0"/>
+              <a:t>16</a:t>
+            </a:fld>
+            <a:endParaRPr lang="en-US"/>
+          </a:p>
+        </p:txBody>
+      </p:sp>
+    </p:spTree>
+    <p:extLst>
+      <p:ext uri="{BB962C8B-B14F-4D97-AF65-F5344CB8AC3E}">
+        <p14:creationId xmlns:p14="http://schemas.microsoft.com/office/powerpoint/2010/main" val="389088223"/>
       </p:ext>
     </p:extLst>
   </p:cSld>
@@ -1281,7 +1370,7 @@
           <a:p>
             <a:fld id="{D9401805-E677-4CFD-A821-C292DA4B749D}" type="datetimeFigureOut">
               <a:rPr lang="en-US" smtClean="0"/>
-              <a:t>3/26/2021</a:t>
+              <a:t>4/22/2022</a:t>
             </a:fld>
             <a:endParaRPr lang="en-US"/>
           </a:p>
@@ -1532,7 +1621,7 @@
           <a:p>
             <a:fld id="{D9401805-E677-4CFD-A821-C292DA4B749D}" type="datetimeFigureOut">
               <a:rPr lang="en-US" smtClean="0"/>
-              <a:t>3/26/2021</a:t>
+              <a:t>4/22/2022</a:t>
             </a:fld>
             <a:endParaRPr lang="en-US"/>
           </a:p>
@@ -1846,7 +1935,7 @@
           <a:p>
             <a:fld id="{D9401805-E677-4CFD-A821-C292DA4B749D}" type="datetimeFigureOut">
               <a:rPr lang="en-US" smtClean="0"/>
-              <a:t>3/26/2021</a:t>
+              <a:t>4/22/2022</a:t>
             </a:fld>
             <a:endParaRPr lang="en-US"/>
           </a:p>
@@ -2187,7 +2276,7 @@
           <a:p>
             <a:fld id="{D9401805-E677-4CFD-A821-C292DA4B749D}" type="datetimeFigureOut">
               <a:rPr lang="en-US" smtClean="0"/>
-              <a:t>3/26/2021</a:t>
+              <a:t>4/22/2022</a:t>
             </a:fld>
             <a:endParaRPr lang="en-US"/>
           </a:p>
@@ -2501,7 +2590,7 @@
           <a:p>
             <a:fld id="{D9401805-E677-4CFD-A821-C292DA4B749D}" type="datetimeFigureOut">
               <a:rPr lang="en-US" smtClean="0"/>
-              <a:t>3/26/2021</a:t>
+              <a:t>4/22/2022</a:t>
             </a:fld>
             <a:endParaRPr lang="en-US"/>
           </a:p>
@@ -2894,7 +2983,7 @@
           <a:p>
             <a:fld id="{D9401805-E677-4CFD-A821-C292DA4B749D}" type="datetimeFigureOut">
               <a:rPr lang="en-US" smtClean="0"/>
-              <a:t>3/26/2021</a:t>
+              <a:t>4/22/2022</a:t>
             </a:fld>
             <a:endParaRPr lang="en-US"/>
           </a:p>
@@ -3064,7 +3153,7 @@
           <a:p>
             <a:fld id="{D9401805-E677-4CFD-A821-C292DA4B749D}" type="datetimeFigureOut">
               <a:rPr lang="en-US" smtClean="0"/>
-              <a:t>3/26/2021</a:t>
+              <a:t>4/22/2022</a:t>
             </a:fld>
             <a:endParaRPr lang="en-US"/>
           </a:p>
@@ -3244,7 +3333,7 @@
           <a:p>
             <a:fld id="{D9401805-E677-4CFD-A821-C292DA4B749D}" type="datetimeFigureOut">
               <a:rPr lang="en-US" smtClean="0"/>
-              <a:t>3/26/2021</a:t>
+              <a:t>4/22/2022</a:t>
             </a:fld>
             <a:endParaRPr lang="en-US"/>
           </a:p>
@@ -3420,7 +3509,7 @@
           <a:p>
             <a:fld id="{D9401805-E677-4CFD-A821-C292DA4B749D}" type="datetimeFigureOut">
               <a:rPr lang="en-US" smtClean="0"/>
-              <a:t>3/26/2021</a:t>
+              <a:t>4/22/2022</a:t>
             </a:fld>
             <a:endParaRPr lang="en-US"/>
           </a:p>
@@ -3667,7 +3756,7 @@
           <a:p>
             <a:fld id="{D9401805-E677-4CFD-A821-C292DA4B749D}" type="datetimeFigureOut">
               <a:rPr lang="en-US" smtClean="0"/>
-              <a:t>3/26/2021</a:t>
+              <a:t>4/22/2022</a:t>
             </a:fld>
             <a:endParaRPr lang="en-US"/>
           </a:p>
@@ -3899,7 +3988,7 @@
           <a:p>
             <a:fld id="{D9401805-E677-4CFD-A821-C292DA4B749D}" type="datetimeFigureOut">
               <a:rPr lang="en-US" smtClean="0"/>
-              <a:t>3/26/2021</a:t>
+              <a:t>4/22/2022</a:t>
             </a:fld>
             <a:endParaRPr lang="en-US"/>
           </a:p>
@@ -4273,7 +4362,7 @@
           <a:p>
             <a:fld id="{D9401805-E677-4CFD-A821-C292DA4B749D}" type="datetimeFigureOut">
               <a:rPr lang="en-US" smtClean="0"/>
-              <a:t>3/26/2021</a:t>
+              <a:t>4/22/2022</a:t>
             </a:fld>
             <a:endParaRPr lang="en-US"/>
           </a:p>
@@ -4396,7 +4485,7 @@
           <a:p>
             <a:fld id="{D9401805-E677-4CFD-A821-C292DA4B749D}" type="datetimeFigureOut">
               <a:rPr lang="en-US" smtClean="0"/>
-              <a:t>3/26/2021</a:t>
+              <a:t>4/22/2022</a:t>
             </a:fld>
             <a:endParaRPr lang="en-US"/>
           </a:p>
@@ -4491,7 +4580,7 @@
           <a:p>
             <a:fld id="{D9401805-E677-4CFD-A821-C292DA4B749D}" type="datetimeFigureOut">
               <a:rPr lang="en-US" smtClean="0"/>
-              <a:t>3/26/2021</a:t>
+              <a:t>4/22/2022</a:t>
             </a:fld>
             <a:endParaRPr lang="en-US"/>
           </a:p>
@@ -4746,7 +4835,7 @@
           <a:p>
             <a:fld id="{D9401805-E677-4CFD-A821-C292DA4B749D}" type="datetimeFigureOut">
               <a:rPr lang="en-US" smtClean="0"/>
-              <a:t>3/26/2021</a:t>
+              <a:t>4/22/2022</a:t>
             </a:fld>
             <a:endParaRPr lang="en-US"/>
           </a:p>
@@ -5009,7 +5098,7 @@
           <a:p>
             <a:fld id="{D9401805-E677-4CFD-A821-C292DA4B749D}" type="datetimeFigureOut">
               <a:rPr lang="en-US" smtClean="0"/>
-              <a:t>3/26/2021</a:t>
+              <a:t>4/22/2022</a:t>
             </a:fld>
             <a:endParaRPr lang="en-US"/>
           </a:p>
@@ -5752,7 +5841,7 @@
           <a:p>
             <a:fld id="{D9401805-E677-4CFD-A821-C292DA4B749D}" type="datetimeFigureOut">
               <a:rPr lang="en-US" smtClean="0"/>
-              <a:t>3/26/2021</a:t>
+              <a:t>4/22/2022</a:t>
             </a:fld>
             <a:endParaRPr lang="en-US"/>
           </a:p>
@@ -6281,7 +6370,7 @@
           <p:cNvPr id="4" name="Title 1">
             <a:extLst>
               <a:ext uri="{FF2B5EF4-FFF2-40B4-BE49-F238E27FC236}">
-                <a16:creationId xmlns="" xmlns:a16="http://schemas.microsoft.com/office/drawing/2014/main" id="{78F05172-2BB6-4969-9FAE-01AFF727CD79}"/>
+                <a16:creationId xmlns:a16="http://schemas.microsoft.com/office/drawing/2014/main" xmlns="" id="{78F05172-2BB6-4969-9FAE-01AFF727CD79}"/>
               </a:ext>
             </a:extLst>
           </p:cNvPr>
@@ -6324,7 +6413,7 @@
           <p:cNvPr id="5" name="Subtitle 2">
             <a:extLst>
               <a:ext uri="{FF2B5EF4-FFF2-40B4-BE49-F238E27FC236}">
-                <a16:creationId xmlns="" xmlns:a16="http://schemas.microsoft.com/office/drawing/2014/main" id="{ABC375FB-063E-45BF-8E88-AAABE78825F5}"/>
+                <a16:creationId xmlns:a16="http://schemas.microsoft.com/office/drawing/2014/main" xmlns="" id="{ABC375FB-063E-45BF-8E88-AAABE78825F5}"/>
               </a:ext>
             </a:extLst>
           </p:cNvPr>
@@ -6357,8 +6446,40 @@
             </a:pPr>
             <a:r>
               <a:rPr lang="ru-RU" sz="2800" dirty="0" smtClean="0"/>
-              <a:t>Обработка исключений</a:t>
-            </a:r>
+              <a:t>Обработка </a:t>
+            </a:r>
+            <a:r>
+              <a:rPr lang="ru-RU" sz="2800" dirty="0" smtClean="0"/>
+              <a:t>исключений</a:t>
+            </a:r>
+          </a:p>
+          <a:p>
+            <a:pPr marL="285750" indent="-285750" algn="l">
+              <a:buSzPct val="100000"/>
+              <a:buFont typeface="Arial" panose="020B0604020202020204" pitchFamily="34" charset="0"/>
+              <a:buChar char="•"/>
+            </a:pPr>
+            <a:r>
+              <a:rPr lang="ru-RU" sz="2800" dirty="0" smtClean="0"/>
+              <a:t>Перегрузка операторов </a:t>
+            </a:r>
+            <a:r>
+              <a:rPr lang="en-US" sz="2800" dirty="0" smtClean="0"/>
+              <a:t>new </a:t>
+            </a:r>
+            <a:r>
+              <a:rPr lang="ru-RU" sz="2800" dirty="0" smtClean="0"/>
+              <a:t>и </a:t>
+            </a:r>
+            <a:r>
+              <a:rPr lang="en-US" sz="2800" dirty="0" smtClean="0"/>
+              <a:t>delete</a:t>
+            </a:r>
+          </a:p>
+          <a:p>
+            <a:pPr algn="l">
+              <a:buSzPct val="100000"/>
+            </a:pPr>
             <a:endParaRPr lang="en-US" sz="2800" dirty="0"/>
           </a:p>
         </p:txBody>
@@ -6568,7 +6689,7 @@
           <p:cNvPr id="6" name="Title 1">
             <a:extLst>
               <a:ext uri="{FF2B5EF4-FFF2-40B4-BE49-F238E27FC236}">
-                <a16:creationId xmlns="" xmlns:a16="http://schemas.microsoft.com/office/drawing/2014/main" id="{ECF0BCE9-3024-43A2-BA59-C2729B585737}"/>
+                <a16:creationId xmlns:a16="http://schemas.microsoft.com/office/drawing/2014/main" xmlns="" id="{ECF0BCE9-3024-43A2-BA59-C2729B585737}"/>
               </a:ext>
             </a:extLst>
           </p:cNvPr>
@@ -6602,11 +6723,7 @@
             <a:pPr algn="ctr"/>
             <a:r>
               <a:rPr lang="ru-RU" sz="2800" dirty="0" smtClean="0"/>
-              <a:t>Исключения. </a:t>
-            </a:r>
-            <a:r>
-              <a:rPr lang="ru-RU" sz="2800" dirty="0" smtClean="0"/>
-              <a:t>Как надо и как не надо</a:t>
+              <a:t>Исключения. Как надо и как не надо</a:t>
             </a:r>
             <a:endParaRPr lang="en-US" sz="2800" dirty="0"/>
           </a:p>
@@ -6854,18 +6971,96 @@
         </p:nvSpPr>
         <p:spPr>
           <a:xfrm>
-            <a:off x="404897" y="1284289"/>
-            <a:ext cx="11517744" cy="3880773"/>
+            <a:off x="404895" y="1017944"/>
+            <a:ext cx="11517744" cy="1536879"/>
           </a:xfrm>
           <a:solidFill>
             <a:schemeClr val="bg1"/>
           </a:solidFill>
         </p:spPr>
         <p:txBody>
-          <a:bodyPr/>
-          <a:lstStyle/>
-          <a:p>
-            <a:endParaRPr lang="en-US" dirty="0"/>
+          <a:bodyPr>
+            <a:normAutofit lnSpcReduction="10000"/>
+          </a:bodyPr>
+          <a:lstStyle/>
+          <a:p>
+            <a:r>
+              <a:rPr lang="ru-RU" sz="1600" dirty="0" smtClean="0"/>
+              <a:t>Оператор </a:t>
+            </a:r>
+            <a:r>
+              <a:rPr lang="en-US" sz="1600" dirty="0" smtClean="0"/>
+              <a:t>new (new-expression) </a:t>
+            </a:r>
+            <a:r>
+              <a:rPr lang="ru-RU" sz="1600" dirty="0" smtClean="0"/>
+              <a:t>и </a:t>
+            </a:r>
+            <a:r>
+              <a:rPr lang="en-US" sz="1600" dirty="0" smtClean="0"/>
+              <a:t>operator new – </a:t>
+            </a:r>
+            <a:r>
+              <a:rPr lang="ru-RU" sz="1600" dirty="0" smtClean="0"/>
+              <a:t>разные вещи. Во </a:t>
+            </a:r>
+            <a:r>
+              <a:rPr lang="ru-RU" sz="1600" dirty="0"/>
+              <a:t>избежание </a:t>
+            </a:r>
+            <a:r>
+              <a:rPr lang="ru-RU" sz="1600" dirty="0" smtClean="0"/>
+              <a:t>путаницы, </a:t>
+            </a:r>
+            <a:r>
+              <a:rPr lang="ru-RU" sz="1600" dirty="0"/>
+              <a:t>п</a:t>
+            </a:r>
+            <a:r>
+              <a:rPr lang="ru-RU" sz="1600" dirty="0" smtClean="0"/>
+              <a:t>ервый будем называть «инструкция </a:t>
+            </a:r>
+            <a:r>
+              <a:rPr lang="en-US" sz="1600" dirty="0" smtClean="0"/>
+              <a:t>new</a:t>
+            </a:r>
+            <a:r>
+              <a:rPr lang="ru-RU" sz="1600" dirty="0" smtClean="0"/>
+              <a:t>»</a:t>
+            </a:r>
+          </a:p>
+          <a:p>
+            <a:r>
+              <a:rPr lang="ru-RU" sz="1600" dirty="0" smtClean="0"/>
+              <a:t>Инструкция </a:t>
+            </a:r>
+            <a:r>
+              <a:rPr lang="en-US" sz="1600" dirty="0" smtClean="0"/>
+              <a:t>new</a:t>
+            </a:r>
+            <a:r>
+              <a:rPr lang="ru-RU" sz="1600" dirty="0" smtClean="0"/>
+              <a:t> – такое же зарезервированное слово, как </a:t>
+            </a:r>
+            <a:r>
+              <a:rPr lang="en-US" sz="1600" dirty="0" smtClean="0"/>
+              <a:t>if, else, class </a:t>
+            </a:r>
+            <a:r>
+              <a:rPr lang="ru-RU" sz="1600" dirty="0" smtClean="0"/>
+              <a:t>и др. Компилятор преобразует их в соответствующие машинные команды</a:t>
+            </a:r>
+          </a:p>
+          <a:p>
+            <a:r>
+              <a:rPr lang="ru-RU" sz="1600" dirty="0" smtClean="0"/>
+              <a:t>Во что преобразуется инструкция </a:t>
+            </a:r>
+            <a:r>
+              <a:rPr lang="en-US" sz="1600" dirty="0" smtClean="0"/>
+              <a:t>new?</a:t>
+            </a:r>
+            <a:endParaRPr lang="en-US" sz="1600" dirty="0"/>
           </a:p>
         </p:txBody>
       </p:sp>
@@ -6874,7 +7069,7 @@
           <p:cNvPr id="4" name="Title 1">
             <a:extLst>
               <a:ext uri="{FF2B5EF4-FFF2-40B4-BE49-F238E27FC236}">
-                <a16:creationId xmlns="" xmlns:a16="http://schemas.microsoft.com/office/drawing/2014/main" id="{ECF0BCE9-3024-43A2-BA59-C2729B585737}"/>
+                <a16:creationId xmlns:a16="http://schemas.microsoft.com/office/drawing/2014/main" xmlns="" id="{ECF0BCE9-3024-43A2-BA59-C2729B585737}"/>
               </a:ext>
             </a:extLst>
           </p:cNvPr>
@@ -6907,14 +7102,901 @@
           <a:p>
             <a:pPr algn="ctr"/>
             <a:r>
+              <a:rPr lang="en-US" sz="2800" dirty="0" smtClean="0"/>
+              <a:t>Operator new </a:t>
+            </a:r>
+            <a:r>
               <a:rPr lang="ru-RU" sz="2800" dirty="0" smtClean="0"/>
-              <a:t>Исключения. </a:t>
-            </a:r>
-            <a:r>
-              <a:rPr lang="ru-RU" sz="2800" dirty="0" smtClean="0"/>
-              <a:t>Быстродействие</a:t>
+              <a:t>и </a:t>
+            </a:r>
+            <a:r>
+              <a:rPr lang="en-US" sz="2800" dirty="0" smtClean="0"/>
+              <a:t>new-expression</a:t>
             </a:r>
             <a:endParaRPr lang="en-US" sz="2800" dirty="0"/>
+          </a:p>
+        </p:txBody>
+      </p:sp>
+      <p:pic>
+        <p:nvPicPr>
+          <p:cNvPr id="2" name="Рисунок 1"/>
+          <p:cNvPicPr>
+            <a:picLocks noChangeAspect="1"/>
+          </p:cNvPicPr>
+          <p:nvPr/>
+        </p:nvPicPr>
+        <p:blipFill rotWithShape="1">
+          <a:blip r:embed="rId2"/>
+          <a:srcRect t="10700"/>
+          <a:stretch/>
+        </p:blipFill>
+        <p:spPr>
+          <a:xfrm>
+            <a:off x="532217" y="3024796"/>
+            <a:ext cx="8449764" cy="435520"/>
+          </a:xfrm>
+          <a:prstGeom prst="rect">
+            <a:avLst/>
+          </a:prstGeom>
+        </p:spPr>
+      </p:pic>
+      <p:sp>
+        <p:nvSpPr>
+          <p:cNvPr id="5" name="Стрелка вниз 4"/>
+          <p:cNvSpPr/>
+          <p:nvPr/>
+        </p:nvSpPr>
+        <p:spPr>
+          <a:xfrm>
+            <a:off x="3680747" y="3275121"/>
+            <a:ext cx="241011" cy="337521"/>
+          </a:xfrm>
+          <a:prstGeom prst="downArrow">
+            <a:avLst/>
+          </a:prstGeom>
+        </p:spPr>
+        <p:style>
+          <a:lnRef idx="2">
+            <a:schemeClr val="accent1">
+              <a:shade val="50000"/>
+            </a:schemeClr>
+          </a:lnRef>
+          <a:fillRef idx="1">
+            <a:schemeClr val="accent1"/>
+          </a:fillRef>
+          <a:effectRef idx="0">
+            <a:schemeClr val="accent1"/>
+          </a:effectRef>
+          <a:fontRef idx="minor">
+            <a:schemeClr val="lt1"/>
+          </a:fontRef>
+        </p:style>
+        <p:txBody>
+          <a:bodyPr rtlCol="0" anchor="ctr"/>
+          <a:lstStyle/>
+          <a:p>
+            <a:pPr algn="ctr"/>
+            <a:endParaRPr lang="en-US"/>
+          </a:p>
+        </p:txBody>
+      </p:sp>
+      <p:sp>
+        <p:nvSpPr>
+          <p:cNvPr id="6" name="TextBox 5"/>
+          <p:cNvSpPr txBox="1"/>
+          <p:nvPr/>
+        </p:nvSpPr>
+        <p:spPr>
+          <a:xfrm>
+            <a:off x="3921758" y="2938129"/>
+            <a:ext cx="488194" cy="369332"/>
+          </a:xfrm>
+          <a:prstGeom prst="rect">
+            <a:avLst/>
+          </a:prstGeom>
+          <a:noFill/>
+          <a:ln>
+            <a:solidFill>
+              <a:schemeClr val="accent1"/>
+            </a:solidFill>
+          </a:ln>
+        </p:spPr>
+        <p:txBody>
+          <a:bodyPr wrap="square" rtlCol="0">
+            <a:spAutoFit/>
+          </a:bodyPr>
+          <a:lstStyle/>
+          <a:p>
+            <a:endParaRPr lang="en-US" dirty="0"/>
+          </a:p>
+        </p:txBody>
+      </p:sp>
+      <p:sp>
+        <p:nvSpPr>
+          <p:cNvPr id="7" name="TextBox 6"/>
+          <p:cNvSpPr txBox="1"/>
+          <p:nvPr/>
+        </p:nvSpPr>
+        <p:spPr>
+          <a:xfrm>
+            <a:off x="4650963" y="2564553"/>
+            <a:ext cx="3736920" cy="369332"/>
+          </a:xfrm>
+          <a:prstGeom prst="rect">
+            <a:avLst/>
+          </a:prstGeom>
+          <a:noFill/>
+        </p:spPr>
+        <p:txBody>
+          <a:bodyPr wrap="none" rtlCol="0">
+            <a:spAutoFit/>
+          </a:bodyPr>
+          <a:lstStyle/>
+          <a:p>
+            <a:r>
+              <a:rPr lang="ru-RU" dirty="0" smtClean="0">
+                <a:solidFill>
+                  <a:srgbClr val="92D050"/>
+                </a:solidFill>
+              </a:rPr>
+              <a:t>инструкция</a:t>
+            </a:r>
+            <a:r>
+              <a:rPr lang="ru-RU" dirty="0" smtClean="0">
+                <a:solidFill>
+                  <a:schemeClr val="bg2">
+                    <a:lumMod val="75000"/>
+                  </a:schemeClr>
+                </a:solidFill>
+              </a:rPr>
+              <a:t> </a:t>
+            </a:r>
+            <a:r>
+              <a:rPr lang="en-US" dirty="0" smtClean="0">
+                <a:solidFill>
+                  <a:srgbClr val="92D050"/>
+                </a:solidFill>
+              </a:rPr>
+              <a:t>new </a:t>
+            </a:r>
+            <a:r>
+              <a:rPr lang="en-US" dirty="0">
+                <a:solidFill>
+                  <a:srgbClr val="92D050"/>
+                </a:solidFill>
+              </a:rPr>
+              <a:t>(new-expression)</a:t>
+            </a:r>
+          </a:p>
+        </p:txBody>
+      </p:sp>
+      <p:cxnSp>
+        <p:nvCxnSpPr>
+          <p:cNvPr id="9" name="Прямая соединительная линия 8"/>
+          <p:cNvCxnSpPr/>
+          <p:nvPr/>
+        </p:nvCxnSpPr>
+        <p:spPr>
+          <a:xfrm flipV="1">
+            <a:off x="4409952" y="2861966"/>
+            <a:ext cx="347147" cy="71920"/>
+          </a:xfrm>
+          <a:prstGeom prst="line">
+            <a:avLst/>
+          </a:prstGeom>
+        </p:spPr>
+        <p:style>
+          <a:lnRef idx="1">
+            <a:schemeClr val="accent1"/>
+          </a:lnRef>
+          <a:fillRef idx="0">
+            <a:schemeClr val="accent1"/>
+          </a:fillRef>
+          <a:effectRef idx="0">
+            <a:schemeClr val="accent1"/>
+          </a:effectRef>
+          <a:fontRef idx="minor">
+            <a:schemeClr val="tx1"/>
+          </a:fontRef>
+        </p:style>
+      </p:cxnSp>
+      <p:pic>
+        <p:nvPicPr>
+          <p:cNvPr id="13" name="Рисунок 12"/>
+          <p:cNvPicPr>
+            <a:picLocks noChangeAspect="1"/>
+          </p:cNvPicPr>
+          <p:nvPr/>
+        </p:nvPicPr>
+        <p:blipFill rotWithShape="1">
+          <a:blip r:embed="rId3"/>
+          <a:srcRect t="9348"/>
+          <a:stretch/>
+        </p:blipFill>
+        <p:spPr>
+          <a:xfrm>
+            <a:off x="532216" y="3654898"/>
+            <a:ext cx="6892117" cy="1668942"/>
+          </a:xfrm>
+          <a:prstGeom prst="rect">
+            <a:avLst/>
+          </a:prstGeom>
+        </p:spPr>
+      </p:pic>
+      <p:sp>
+        <p:nvSpPr>
+          <p:cNvPr id="15" name="TextBox 14"/>
+          <p:cNvSpPr txBox="1"/>
+          <p:nvPr/>
+        </p:nvSpPr>
+        <p:spPr>
+          <a:xfrm>
+            <a:off x="2628898" y="3723640"/>
+            <a:ext cx="1714500" cy="369332"/>
+          </a:xfrm>
+          <a:prstGeom prst="rect">
+            <a:avLst/>
+          </a:prstGeom>
+          <a:noFill/>
+          <a:ln>
+            <a:solidFill>
+              <a:srgbClr val="92D050"/>
+            </a:solidFill>
+          </a:ln>
+        </p:spPr>
+        <p:txBody>
+          <a:bodyPr wrap="square" rtlCol="0">
+            <a:spAutoFit/>
+          </a:bodyPr>
+          <a:lstStyle/>
+          <a:p>
+            <a:endParaRPr lang="en-US" dirty="0"/>
+          </a:p>
+        </p:txBody>
+      </p:sp>
+      <p:cxnSp>
+        <p:nvCxnSpPr>
+          <p:cNvPr id="17" name="Прямая соединительная линия 16"/>
+          <p:cNvCxnSpPr/>
+          <p:nvPr/>
+        </p:nvCxnSpPr>
+        <p:spPr>
+          <a:xfrm flipV="1">
+            <a:off x="4343398" y="3556000"/>
+            <a:ext cx="495300" cy="167640"/>
+          </a:xfrm>
+          <a:prstGeom prst="line">
+            <a:avLst/>
+          </a:prstGeom>
+        </p:spPr>
+        <p:style>
+          <a:lnRef idx="1">
+            <a:schemeClr val="accent1"/>
+          </a:lnRef>
+          <a:fillRef idx="0">
+            <a:schemeClr val="accent1"/>
+          </a:fillRef>
+          <a:effectRef idx="0">
+            <a:schemeClr val="accent1"/>
+          </a:effectRef>
+          <a:fontRef idx="minor">
+            <a:schemeClr val="tx1"/>
+          </a:fontRef>
+        </p:style>
+      </p:cxnSp>
+      <p:sp>
+        <p:nvSpPr>
+          <p:cNvPr id="18" name="TextBox 17"/>
+          <p:cNvSpPr txBox="1"/>
+          <p:nvPr/>
+        </p:nvSpPr>
+        <p:spPr>
+          <a:xfrm>
+            <a:off x="4846942" y="3323492"/>
+            <a:ext cx="1604927" cy="369332"/>
+          </a:xfrm>
+          <a:prstGeom prst="rect">
+            <a:avLst/>
+          </a:prstGeom>
+          <a:noFill/>
+        </p:spPr>
+        <p:txBody>
+          <a:bodyPr wrap="none" rtlCol="0">
+            <a:spAutoFit/>
+          </a:bodyPr>
+          <a:lstStyle/>
+          <a:p>
+            <a:r>
+              <a:rPr lang="en-US" dirty="0" smtClean="0">
+                <a:solidFill>
+                  <a:srgbClr val="92D050"/>
+                </a:solidFill>
+              </a:rPr>
+              <a:t>operator new</a:t>
+            </a:r>
+            <a:endParaRPr lang="en-US" dirty="0">
+              <a:solidFill>
+                <a:srgbClr val="92D050"/>
+              </a:solidFill>
+            </a:endParaRPr>
+          </a:p>
+        </p:txBody>
+      </p:sp>
+      <p:cxnSp>
+        <p:nvCxnSpPr>
+          <p:cNvPr id="20" name="Прямая соединительная линия 19"/>
+          <p:cNvCxnSpPr/>
+          <p:nvPr/>
+        </p:nvCxnSpPr>
+        <p:spPr>
+          <a:xfrm>
+            <a:off x="6705598" y="3908306"/>
+            <a:ext cx="1272540" cy="0"/>
+          </a:xfrm>
+          <a:prstGeom prst="line">
+            <a:avLst/>
+          </a:prstGeom>
+        </p:spPr>
+        <p:style>
+          <a:lnRef idx="1">
+            <a:schemeClr val="accent1"/>
+          </a:lnRef>
+          <a:fillRef idx="0">
+            <a:schemeClr val="accent1"/>
+          </a:fillRef>
+          <a:effectRef idx="0">
+            <a:schemeClr val="accent1"/>
+          </a:effectRef>
+          <a:fontRef idx="minor">
+            <a:schemeClr val="tx1"/>
+          </a:fontRef>
+        </p:style>
+      </p:cxnSp>
+      <p:sp>
+        <p:nvSpPr>
+          <p:cNvPr id="22" name="TextBox 21"/>
+          <p:cNvSpPr txBox="1"/>
+          <p:nvPr/>
+        </p:nvSpPr>
+        <p:spPr>
+          <a:xfrm>
+            <a:off x="8052329" y="3370947"/>
+            <a:ext cx="3870309" cy="584775"/>
+          </a:xfrm>
+          <a:prstGeom prst="rect">
+            <a:avLst/>
+          </a:prstGeom>
+        </p:spPr>
+        <p:style>
+          <a:lnRef idx="2">
+            <a:schemeClr val="accent1"/>
+          </a:lnRef>
+          <a:fillRef idx="1">
+            <a:schemeClr val="lt1"/>
+          </a:fillRef>
+          <a:effectRef idx="0">
+            <a:schemeClr val="accent1"/>
+          </a:effectRef>
+          <a:fontRef idx="minor">
+            <a:schemeClr val="dk1"/>
+          </a:fontRef>
+        </p:style>
+        <p:txBody>
+          <a:bodyPr wrap="square" rtlCol="0">
+            <a:spAutoFit/>
+          </a:bodyPr>
+          <a:lstStyle/>
+          <a:p>
+            <a:r>
+              <a:rPr lang="ru-RU" sz="1600" dirty="0" smtClean="0"/>
+              <a:t>Оператор </a:t>
+            </a:r>
+            <a:r>
+              <a:rPr lang="en-US" sz="1600" dirty="0" smtClean="0"/>
+              <a:t>new </a:t>
+            </a:r>
+            <a:r>
+              <a:rPr lang="ru-RU" sz="1600" dirty="0" smtClean="0"/>
+              <a:t>выделяет нужное </a:t>
+            </a:r>
+          </a:p>
+          <a:p>
+            <a:r>
+              <a:rPr lang="ru-RU" sz="1600" dirty="0" smtClean="0"/>
+              <a:t>количество памяти</a:t>
+            </a:r>
+          </a:p>
+        </p:txBody>
+      </p:sp>
+      <p:cxnSp>
+        <p:nvCxnSpPr>
+          <p:cNvPr id="25" name="Прямая соединительная линия 24"/>
+          <p:cNvCxnSpPr>
+            <a:stCxn id="13" idx="3"/>
+          </p:cNvCxnSpPr>
+          <p:nvPr/>
+        </p:nvCxnSpPr>
+        <p:spPr>
+          <a:xfrm flipV="1">
+            <a:off x="7424333" y="4485355"/>
+            <a:ext cx="553805" cy="4014"/>
+          </a:xfrm>
+          <a:prstGeom prst="line">
+            <a:avLst/>
+          </a:prstGeom>
+        </p:spPr>
+        <p:style>
+          <a:lnRef idx="1">
+            <a:schemeClr val="accent1"/>
+          </a:lnRef>
+          <a:fillRef idx="0">
+            <a:schemeClr val="accent1"/>
+          </a:fillRef>
+          <a:effectRef idx="0">
+            <a:schemeClr val="accent1"/>
+          </a:effectRef>
+          <a:fontRef idx="minor">
+            <a:schemeClr val="tx1"/>
+          </a:fontRef>
+        </p:style>
+      </p:cxnSp>
+      <p:sp>
+        <p:nvSpPr>
+          <p:cNvPr id="26" name="TextBox 25"/>
+          <p:cNvSpPr txBox="1"/>
+          <p:nvPr/>
+        </p:nvSpPr>
+        <p:spPr>
+          <a:xfrm>
+            <a:off x="6233158" y="4302760"/>
+            <a:ext cx="868680" cy="369332"/>
+          </a:xfrm>
+          <a:prstGeom prst="rect">
+            <a:avLst/>
+          </a:prstGeom>
+          <a:noFill/>
+          <a:ln>
+            <a:solidFill>
+              <a:srgbClr val="92D050"/>
+            </a:solidFill>
+          </a:ln>
+        </p:spPr>
+        <p:txBody>
+          <a:bodyPr wrap="square" rtlCol="0">
+            <a:spAutoFit/>
+          </a:bodyPr>
+          <a:lstStyle/>
+          <a:p>
+            <a:endParaRPr lang="en-US" dirty="0"/>
+          </a:p>
+        </p:txBody>
+      </p:sp>
+      <p:sp>
+        <p:nvSpPr>
+          <p:cNvPr id="30" name="TextBox 29"/>
+          <p:cNvSpPr txBox="1"/>
+          <p:nvPr/>
+        </p:nvSpPr>
+        <p:spPr>
+          <a:xfrm>
+            <a:off x="8052328" y="4071927"/>
+            <a:ext cx="3870309" cy="830997"/>
+          </a:xfrm>
+          <a:prstGeom prst="rect">
+            <a:avLst/>
+          </a:prstGeom>
+        </p:spPr>
+        <p:style>
+          <a:lnRef idx="2">
+            <a:schemeClr val="accent1"/>
+          </a:lnRef>
+          <a:fillRef idx="1">
+            <a:schemeClr val="lt1"/>
+          </a:fillRef>
+          <a:effectRef idx="0">
+            <a:schemeClr val="accent1"/>
+          </a:effectRef>
+          <a:fontRef idx="minor">
+            <a:schemeClr val="dk1"/>
+          </a:fontRef>
+        </p:style>
+        <p:txBody>
+          <a:bodyPr wrap="square" rtlCol="0">
+            <a:spAutoFit/>
+          </a:bodyPr>
+          <a:lstStyle/>
+          <a:p>
+            <a:r>
+              <a:rPr lang="ru-RU" sz="1600" dirty="0" smtClean="0"/>
+              <a:t>В данной памяти создаётся объект. Программист не может определить такой конструктор</a:t>
+            </a:r>
+            <a:endParaRPr lang="ru-RU" dirty="0" smtClean="0"/>
+          </a:p>
+        </p:txBody>
+      </p:sp>
+      <p:sp>
+        <p:nvSpPr>
+          <p:cNvPr id="31" name="TextBox 30"/>
+          <p:cNvSpPr txBox="1"/>
+          <p:nvPr/>
+        </p:nvSpPr>
+        <p:spPr>
+          <a:xfrm>
+            <a:off x="3077536" y="5223305"/>
+            <a:ext cx="1332416" cy="338554"/>
+          </a:xfrm>
+          <a:prstGeom prst="rect">
+            <a:avLst/>
+          </a:prstGeom>
+          <a:noFill/>
+        </p:spPr>
+        <p:txBody>
+          <a:bodyPr wrap="none" rtlCol="0">
+            <a:spAutoFit/>
+          </a:bodyPr>
+          <a:lstStyle/>
+          <a:p>
+            <a:r>
+              <a:rPr lang="ru-RU" sz="1600" dirty="0" smtClean="0">
+                <a:solidFill>
+                  <a:schemeClr val="bg1">
+                    <a:lumMod val="65000"/>
+                  </a:schemeClr>
+                </a:solidFill>
+              </a:rPr>
+              <a:t>(псевдокод)</a:t>
+            </a:r>
+            <a:endParaRPr lang="en-US" sz="1600" dirty="0">
+              <a:solidFill>
+                <a:schemeClr val="bg1">
+                  <a:lumMod val="65000"/>
+                </a:schemeClr>
+              </a:solidFill>
+            </a:endParaRPr>
+          </a:p>
+        </p:txBody>
+      </p:sp>
+      <p:sp>
+        <p:nvSpPr>
+          <p:cNvPr id="32" name="TextBox 31"/>
+          <p:cNvSpPr txBox="1"/>
+          <p:nvPr/>
+        </p:nvSpPr>
+        <p:spPr>
+          <a:xfrm>
+            <a:off x="8052327" y="5018146"/>
+            <a:ext cx="3870309" cy="830997"/>
+          </a:xfrm>
+          <a:prstGeom prst="rect">
+            <a:avLst/>
+          </a:prstGeom>
+        </p:spPr>
+        <p:style>
+          <a:lnRef idx="2">
+            <a:schemeClr val="accent1"/>
+          </a:lnRef>
+          <a:fillRef idx="1">
+            <a:schemeClr val="lt1"/>
+          </a:fillRef>
+          <a:effectRef idx="0">
+            <a:schemeClr val="accent1"/>
+          </a:effectRef>
+          <a:fontRef idx="minor">
+            <a:schemeClr val="dk1"/>
+          </a:fontRef>
+        </p:style>
+        <p:txBody>
+          <a:bodyPr wrap="square" rtlCol="0">
+            <a:spAutoFit/>
+          </a:bodyPr>
+          <a:lstStyle/>
+          <a:p>
+            <a:r>
+              <a:rPr lang="ru-RU" sz="1600" dirty="0" smtClean="0"/>
+              <a:t>Тип указателя на данную область памяти преобразуется к  указателю на тип (класс) объекта</a:t>
+            </a:r>
+          </a:p>
+        </p:txBody>
+      </p:sp>
+      <p:cxnSp>
+        <p:nvCxnSpPr>
+          <p:cNvPr id="34" name="Прямая соединительная линия 33"/>
+          <p:cNvCxnSpPr/>
+          <p:nvPr/>
+        </p:nvCxnSpPr>
+        <p:spPr>
+          <a:xfrm flipV="1">
+            <a:off x="6929120" y="5128845"/>
+            <a:ext cx="1123207" cy="2316"/>
+          </a:xfrm>
+          <a:prstGeom prst="line">
+            <a:avLst/>
+          </a:prstGeom>
+        </p:spPr>
+        <p:style>
+          <a:lnRef idx="1">
+            <a:schemeClr val="accent1"/>
+          </a:lnRef>
+          <a:fillRef idx="0">
+            <a:schemeClr val="accent1"/>
+          </a:fillRef>
+          <a:effectRef idx="0">
+            <a:schemeClr val="accent1"/>
+          </a:effectRef>
+          <a:fontRef idx="minor">
+            <a:schemeClr val="tx1"/>
+          </a:fontRef>
+        </p:style>
+      </p:cxnSp>
+      <p:sp>
+        <p:nvSpPr>
+          <p:cNvPr id="36" name="Объект 2"/>
+          <p:cNvSpPr txBox="1">
+            <a:spLocks/>
+          </p:cNvSpPr>
+          <p:nvPr/>
+        </p:nvSpPr>
+        <p:spPr>
+          <a:xfrm>
+            <a:off x="404894" y="6125778"/>
+            <a:ext cx="11517744" cy="611611"/>
+          </a:xfrm>
+          <a:prstGeom prst="rect">
+            <a:avLst/>
+          </a:prstGeom>
+          <a:solidFill>
+            <a:schemeClr val="bg1"/>
+          </a:solidFill>
+        </p:spPr>
+        <p:txBody>
+          <a:bodyPr vert="horz" lIns="91440" tIns="45720" rIns="91440" bIns="45720" rtlCol="0">
+            <a:normAutofit/>
+          </a:bodyPr>
+          <a:lstStyle>
+            <a:lvl1pPr marL="342900" indent="-342900" algn="l" defTabSz="457200" rtl="0" eaLnBrk="1" latinLnBrk="0" hangingPunct="1">
+              <a:spcBef>
+                <a:spcPts val="1000"/>
+              </a:spcBef>
+              <a:spcAft>
+                <a:spcPts val="0"/>
+              </a:spcAft>
+              <a:buClr>
+                <a:schemeClr val="accent1"/>
+              </a:buClr>
+              <a:buSzPct val="80000"/>
+              <a:buFont typeface="Wingdings 3" charset="2"/>
+              <a:buChar char=""/>
+              <a:defRPr sz="1800" kern="1200">
+                <a:solidFill>
+                  <a:schemeClr val="tx1">
+                    <a:lumMod val="75000"/>
+                    <a:lumOff val="25000"/>
+                  </a:schemeClr>
+                </a:solidFill>
+                <a:latin typeface="+mn-lt"/>
+                <a:ea typeface="+mn-ea"/>
+                <a:cs typeface="+mn-cs"/>
+              </a:defRPr>
+            </a:lvl1pPr>
+            <a:lvl2pPr marL="742950" indent="-285750" algn="l" defTabSz="457200" rtl="0" eaLnBrk="1" latinLnBrk="0" hangingPunct="1">
+              <a:spcBef>
+                <a:spcPts val="1000"/>
+              </a:spcBef>
+              <a:spcAft>
+                <a:spcPts val="0"/>
+              </a:spcAft>
+              <a:buClr>
+                <a:schemeClr val="accent1"/>
+              </a:buClr>
+              <a:buSzPct val="80000"/>
+              <a:buFont typeface="Wingdings 3" charset="2"/>
+              <a:buChar char=""/>
+              <a:defRPr sz="1600" kern="1200">
+                <a:solidFill>
+                  <a:schemeClr val="tx1">
+                    <a:lumMod val="75000"/>
+                    <a:lumOff val="25000"/>
+                  </a:schemeClr>
+                </a:solidFill>
+                <a:latin typeface="+mn-lt"/>
+                <a:ea typeface="+mn-ea"/>
+                <a:cs typeface="+mn-cs"/>
+              </a:defRPr>
+            </a:lvl2pPr>
+            <a:lvl3pPr marL="1143000" indent="-228600" algn="l" defTabSz="457200" rtl="0" eaLnBrk="1" latinLnBrk="0" hangingPunct="1">
+              <a:spcBef>
+                <a:spcPts val="1000"/>
+              </a:spcBef>
+              <a:spcAft>
+                <a:spcPts val="0"/>
+              </a:spcAft>
+              <a:buClr>
+                <a:schemeClr val="accent1"/>
+              </a:buClr>
+              <a:buSzPct val="80000"/>
+              <a:buFont typeface="Wingdings 3" charset="2"/>
+              <a:buChar char=""/>
+              <a:defRPr sz="1400" kern="1200">
+                <a:solidFill>
+                  <a:schemeClr val="tx1">
+                    <a:lumMod val="75000"/>
+                    <a:lumOff val="25000"/>
+                  </a:schemeClr>
+                </a:solidFill>
+                <a:latin typeface="+mn-lt"/>
+                <a:ea typeface="+mn-ea"/>
+                <a:cs typeface="+mn-cs"/>
+              </a:defRPr>
+            </a:lvl3pPr>
+            <a:lvl4pPr marL="1600200" indent="-228600" algn="l" defTabSz="457200" rtl="0" eaLnBrk="1" latinLnBrk="0" hangingPunct="1">
+              <a:spcBef>
+                <a:spcPts val="1000"/>
+              </a:spcBef>
+              <a:spcAft>
+                <a:spcPts val="0"/>
+              </a:spcAft>
+              <a:buClr>
+                <a:schemeClr val="accent1"/>
+              </a:buClr>
+              <a:buSzPct val="80000"/>
+              <a:buFont typeface="Wingdings 3" charset="2"/>
+              <a:buChar char=""/>
+              <a:defRPr sz="1200" kern="1200">
+                <a:solidFill>
+                  <a:schemeClr val="tx1">
+                    <a:lumMod val="75000"/>
+                    <a:lumOff val="25000"/>
+                  </a:schemeClr>
+                </a:solidFill>
+                <a:latin typeface="+mn-lt"/>
+                <a:ea typeface="+mn-ea"/>
+                <a:cs typeface="+mn-cs"/>
+              </a:defRPr>
+            </a:lvl4pPr>
+            <a:lvl5pPr marL="2057400" indent="-228600" algn="l" defTabSz="457200" rtl="0" eaLnBrk="1" latinLnBrk="0" hangingPunct="1">
+              <a:spcBef>
+                <a:spcPts val="1000"/>
+              </a:spcBef>
+              <a:spcAft>
+                <a:spcPts val="0"/>
+              </a:spcAft>
+              <a:buClr>
+                <a:schemeClr val="accent1"/>
+              </a:buClr>
+              <a:buSzPct val="80000"/>
+              <a:buFont typeface="Wingdings 3" charset="2"/>
+              <a:buChar char=""/>
+              <a:defRPr sz="1200" kern="1200">
+                <a:solidFill>
+                  <a:schemeClr val="tx1">
+                    <a:lumMod val="75000"/>
+                    <a:lumOff val="25000"/>
+                  </a:schemeClr>
+                </a:solidFill>
+                <a:latin typeface="+mn-lt"/>
+                <a:ea typeface="+mn-ea"/>
+                <a:cs typeface="+mn-cs"/>
+              </a:defRPr>
+            </a:lvl5pPr>
+            <a:lvl6pPr marL="2514600" indent="-228600" algn="l" defTabSz="457200" rtl="0" eaLnBrk="1" latinLnBrk="0" hangingPunct="1">
+              <a:spcBef>
+                <a:spcPts val="1000"/>
+              </a:spcBef>
+              <a:spcAft>
+                <a:spcPts val="0"/>
+              </a:spcAft>
+              <a:buClr>
+                <a:schemeClr val="accent1"/>
+              </a:buClr>
+              <a:buSzPct val="80000"/>
+              <a:buFont typeface="Wingdings 3" charset="2"/>
+              <a:buChar char=""/>
+              <a:defRPr sz="1200" kern="1200">
+                <a:solidFill>
+                  <a:schemeClr val="tx1">
+                    <a:lumMod val="75000"/>
+                    <a:lumOff val="25000"/>
+                  </a:schemeClr>
+                </a:solidFill>
+                <a:latin typeface="+mn-lt"/>
+                <a:ea typeface="+mn-ea"/>
+                <a:cs typeface="+mn-cs"/>
+              </a:defRPr>
+            </a:lvl6pPr>
+            <a:lvl7pPr marL="2971800" indent="-228600" algn="l" defTabSz="457200" rtl="0" eaLnBrk="1" latinLnBrk="0" hangingPunct="1">
+              <a:spcBef>
+                <a:spcPts val="1000"/>
+              </a:spcBef>
+              <a:spcAft>
+                <a:spcPts val="0"/>
+              </a:spcAft>
+              <a:buClr>
+                <a:schemeClr val="accent1"/>
+              </a:buClr>
+              <a:buSzPct val="80000"/>
+              <a:buFont typeface="Wingdings 3" charset="2"/>
+              <a:buChar char=""/>
+              <a:defRPr sz="1200" kern="1200">
+                <a:solidFill>
+                  <a:schemeClr val="tx1">
+                    <a:lumMod val="75000"/>
+                    <a:lumOff val="25000"/>
+                  </a:schemeClr>
+                </a:solidFill>
+                <a:latin typeface="+mn-lt"/>
+                <a:ea typeface="+mn-ea"/>
+                <a:cs typeface="+mn-cs"/>
+              </a:defRPr>
+            </a:lvl7pPr>
+            <a:lvl8pPr marL="3429000" indent="-228600" algn="l" defTabSz="457200" rtl="0" eaLnBrk="1" latinLnBrk="0" hangingPunct="1">
+              <a:spcBef>
+                <a:spcPts val="1000"/>
+              </a:spcBef>
+              <a:spcAft>
+                <a:spcPts val="0"/>
+              </a:spcAft>
+              <a:buClr>
+                <a:schemeClr val="accent1"/>
+              </a:buClr>
+              <a:buSzPct val="80000"/>
+              <a:buFont typeface="Wingdings 3" charset="2"/>
+              <a:buChar char=""/>
+              <a:defRPr sz="1200" kern="1200">
+                <a:solidFill>
+                  <a:schemeClr val="tx1">
+                    <a:lumMod val="75000"/>
+                    <a:lumOff val="25000"/>
+                  </a:schemeClr>
+                </a:solidFill>
+                <a:latin typeface="+mn-lt"/>
+                <a:ea typeface="+mn-ea"/>
+                <a:cs typeface="+mn-cs"/>
+              </a:defRPr>
+            </a:lvl8pPr>
+            <a:lvl9pPr marL="3886200" indent="-228600" algn="l" defTabSz="457200" rtl="0" eaLnBrk="1" latinLnBrk="0" hangingPunct="1">
+              <a:spcBef>
+                <a:spcPts val="1000"/>
+              </a:spcBef>
+              <a:spcAft>
+                <a:spcPts val="0"/>
+              </a:spcAft>
+              <a:buClr>
+                <a:schemeClr val="accent1"/>
+              </a:buClr>
+              <a:buSzPct val="80000"/>
+              <a:buFont typeface="Wingdings 3" charset="2"/>
+              <a:buChar char=""/>
+              <a:defRPr sz="1200" kern="1200">
+                <a:solidFill>
+                  <a:schemeClr val="tx1">
+                    <a:lumMod val="75000"/>
+                    <a:lumOff val="25000"/>
+                  </a:schemeClr>
+                </a:solidFill>
+                <a:latin typeface="+mn-lt"/>
+                <a:ea typeface="+mn-ea"/>
+                <a:cs typeface="+mn-cs"/>
+              </a:defRPr>
+            </a:lvl9pPr>
+          </a:lstStyle>
+          <a:p>
+            <a:r>
+              <a:rPr lang="en-US" sz="1600" dirty="0" smtClean="0"/>
+              <a:t>operator new </a:t>
+            </a:r>
+            <a:r>
+              <a:rPr lang="ru-RU" sz="1600" dirty="0" smtClean="0"/>
+              <a:t>реализует только часть действий, выполняемых инструкцией </a:t>
+            </a:r>
+            <a:r>
+              <a:rPr lang="en-US" sz="1600" dirty="0" smtClean="0"/>
+              <a:t>new - </a:t>
+            </a:r>
+            <a:r>
+              <a:rPr lang="ru-RU" sz="1600" dirty="0" smtClean="0"/>
+              <a:t> определяет, как именно будет выделяться память</a:t>
+            </a:r>
+            <a:endParaRPr lang="en-US" sz="1600" dirty="0"/>
           </a:p>
         </p:txBody>
       </p:sp>
@@ -6922,6 +8004,2994 @@
     <p:extLst>
       <p:ext uri="{BB962C8B-B14F-4D97-AF65-F5344CB8AC3E}">
         <p14:creationId xmlns:p14="http://schemas.microsoft.com/office/powerpoint/2010/main" val="78990975"/>
+      </p:ext>
+    </p:extLst>
+  </p:cSld>
+  <p:clrMapOvr>
+    <a:masterClrMapping/>
+  </p:clrMapOvr>
+</p:sld>
+</file>
+
+<file path=ppt/slides/slide12.xml><?xml version="1.0" encoding="utf-8"?>
+<p:sld xmlns:a="http://schemas.openxmlformats.org/drawingml/2006/main" xmlns:r="http://schemas.openxmlformats.org/officeDocument/2006/relationships" xmlns:p="http://schemas.openxmlformats.org/presentationml/2006/main">
+  <p:cSld>
+    <p:spTree>
+      <p:nvGrpSpPr>
+        <p:cNvPr id="1" name=""/>
+        <p:cNvGrpSpPr/>
+        <p:nvPr/>
+      </p:nvGrpSpPr>
+      <p:grpSpPr>
+        <a:xfrm>
+          <a:off x="0" y="0"/>
+          <a:ext cx="0" cy="0"/>
+          <a:chOff x="0" y="0"/>
+          <a:chExt cx="0" cy="0"/>
+        </a:xfrm>
+      </p:grpSpPr>
+      <p:sp>
+        <p:nvSpPr>
+          <p:cNvPr id="3" name="Объект 2"/>
+          <p:cNvSpPr>
+            <a:spLocks noGrp="1"/>
+          </p:cNvSpPr>
+          <p:nvPr>
+            <p:ph idx="1"/>
+          </p:nvPr>
+        </p:nvSpPr>
+        <p:spPr>
+          <a:xfrm>
+            <a:off x="404897" y="4441268"/>
+            <a:ext cx="11517744" cy="2402879"/>
+          </a:xfrm>
+          <a:solidFill>
+            <a:schemeClr val="bg1"/>
+          </a:solidFill>
+        </p:spPr>
+        <p:txBody>
+          <a:bodyPr>
+            <a:normAutofit/>
+          </a:bodyPr>
+          <a:lstStyle/>
+          <a:p>
+            <a:pPr>
+              <a:buFont typeface="+mj-lt"/>
+              <a:buAutoNum type="arabicPeriod"/>
+            </a:pPr>
+            <a:r>
+              <a:rPr lang="ru-RU" sz="1600" dirty="0" smtClean="0"/>
+              <a:t>Выделяет </a:t>
+            </a:r>
+            <a:r>
+              <a:rPr lang="en-US" sz="1600" dirty="0" smtClean="0"/>
+              <a:t>count </a:t>
+            </a:r>
+            <a:r>
+              <a:rPr lang="ru-RU" sz="1600" dirty="0" smtClean="0"/>
+              <a:t>байт памяти. В случае невозможности выделения памяти генерирует исключение </a:t>
+            </a:r>
+            <a:r>
+              <a:rPr lang="en-US" sz="1600" dirty="0" err="1" smtClean="0"/>
+              <a:t>std</a:t>
+            </a:r>
+            <a:r>
+              <a:rPr lang="en-US" sz="1600" dirty="0" smtClean="0"/>
+              <a:t>::</a:t>
+            </a:r>
+            <a:r>
+              <a:rPr lang="en-US" sz="1600" dirty="0" err="1" smtClean="0"/>
+              <a:t>bad_alloc</a:t>
+            </a:r>
+            <a:endParaRPr lang="ru-RU" sz="1600" dirty="0" smtClean="0"/>
+          </a:p>
+          <a:p>
+            <a:pPr>
+              <a:buFont typeface="+mj-lt"/>
+              <a:buAutoNum type="arabicPeriod"/>
+            </a:pPr>
+            <a:r>
+              <a:rPr lang="ru-RU" sz="1600" dirty="0" smtClean="0"/>
+              <a:t>То же, что и (1), но позволяет управлять выравниванием. Выравнивание – оптимизация расположения данных в оперативной памяти с точки зрения скорости доступа. Определяется границами машинных слов</a:t>
+            </a:r>
+          </a:p>
+          <a:p>
+            <a:pPr>
+              <a:buFont typeface="+mj-lt"/>
+              <a:buAutoNum type="arabicPeriod"/>
+            </a:pPr>
+            <a:r>
+              <a:rPr lang="ru-RU" sz="1600" dirty="0" smtClean="0"/>
+              <a:t> </a:t>
+            </a:r>
+            <a:r>
+              <a:rPr lang="ru-RU" sz="1600" dirty="0"/>
+              <a:t>Выделяет </a:t>
+            </a:r>
+            <a:r>
+              <a:rPr lang="en-US" sz="1600" dirty="0"/>
+              <a:t>count </a:t>
+            </a:r>
+            <a:r>
+              <a:rPr lang="ru-RU" sz="1600" dirty="0"/>
+              <a:t>байт </a:t>
+            </a:r>
+            <a:r>
+              <a:rPr lang="ru-RU" sz="1600" dirty="0" smtClean="0"/>
+              <a:t>памяти. В случае невозможности выделения памяти</a:t>
+            </a:r>
+            <a:r>
+              <a:rPr lang="en-US" sz="1600" dirty="0" smtClean="0"/>
+              <a:t> </a:t>
+            </a:r>
+            <a:r>
+              <a:rPr lang="ru-RU" sz="1600" dirty="0" smtClean="0"/>
+              <a:t>возвращает </a:t>
+            </a:r>
+            <a:r>
+              <a:rPr lang="en-US" sz="1600" dirty="0" err="1" smtClean="0"/>
+              <a:t>nullptr</a:t>
+            </a:r>
+            <a:r>
+              <a:rPr lang="en-US" sz="1600" dirty="0" smtClean="0"/>
+              <a:t>. </a:t>
+            </a:r>
+            <a:r>
+              <a:rPr lang="ru-RU" sz="1600" dirty="0" smtClean="0"/>
+              <a:t>Исключения не генерирует</a:t>
+            </a:r>
+          </a:p>
+          <a:p>
+            <a:pPr>
+              <a:buFont typeface="+mj-lt"/>
+              <a:buAutoNum type="arabicPeriod"/>
+            </a:pPr>
+            <a:r>
+              <a:rPr lang="ru-RU" sz="1600" dirty="0" smtClean="0"/>
+              <a:t>Не выделяет память, возвращает значение параметра </a:t>
+            </a:r>
+            <a:r>
+              <a:rPr lang="en-US" sz="1600" dirty="0" err="1" smtClean="0"/>
+              <a:t>ptr</a:t>
+            </a:r>
+            <a:r>
+              <a:rPr lang="en-US" sz="1600" dirty="0" smtClean="0"/>
+              <a:t> </a:t>
+            </a:r>
+            <a:r>
+              <a:rPr lang="ru-RU" sz="1600" dirty="0" smtClean="0"/>
+              <a:t>в неизменном виде. Используется буферизованной инструкцией </a:t>
+            </a:r>
+            <a:r>
+              <a:rPr lang="en-US" sz="1600" dirty="0" smtClean="0"/>
+              <a:t>new (placement-new)</a:t>
+            </a:r>
+            <a:endParaRPr lang="en-US" sz="1600" dirty="0"/>
+          </a:p>
+        </p:txBody>
+      </p:sp>
+      <p:sp>
+        <p:nvSpPr>
+          <p:cNvPr id="4" name="Title 1">
+            <a:extLst>
+              <a:ext uri="{FF2B5EF4-FFF2-40B4-BE49-F238E27FC236}">
+                <a16:creationId xmlns:a16="http://schemas.microsoft.com/office/drawing/2014/main" xmlns="" id="{ECF0BCE9-3024-43A2-BA59-C2729B585737}"/>
+              </a:ext>
+            </a:extLst>
+          </p:cNvPr>
+          <p:cNvSpPr>
+            <a:spLocks noGrp="1"/>
+          </p:cNvSpPr>
+          <p:nvPr>
+            <p:ph type="title"/>
+          </p:nvPr>
+        </p:nvSpPr>
+        <p:spPr>
+          <a:xfrm>
+            <a:off x="404897" y="175616"/>
+            <a:ext cx="11517744" cy="628335"/>
+          </a:xfrm>
+          <a:solidFill>
+            <a:schemeClr val="bg1"/>
+          </a:solidFill>
+          <a:ln>
+            <a:solidFill>
+              <a:schemeClr val="tx1"/>
+            </a:solidFill>
+          </a:ln>
+        </p:spPr>
+        <p:txBody>
+          <a:bodyPr>
+            <a:noAutofit/>
+          </a:bodyPr>
+          <a:lstStyle/>
+          <a:p>
+            <a:pPr algn="ctr"/>
+            <a:r>
+              <a:rPr lang="ru-RU" sz="2800" dirty="0" smtClean="0"/>
+              <a:t>Перегрузка глобального </a:t>
+            </a:r>
+            <a:r>
+              <a:rPr lang="en-US" sz="2800" dirty="0" smtClean="0"/>
+              <a:t>operator new</a:t>
+            </a:r>
+            <a:endParaRPr lang="en-US" sz="2800" dirty="0"/>
+          </a:p>
+        </p:txBody>
+      </p:sp>
+      <p:pic>
+        <p:nvPicPr>
+          <p:cNvPr id="5" name="Рисунок 4"/>
+          <p:cNvPicPr>
+            <a:picLocks noChangeAspect="1"/>
+          </p:cNvPicPr>
+          <p:nvPr/>
+        </p:nvPicPr>
+        <p:blipFill rotWithShape="1">
+          <a:blip r:embed="rId2"/>
+          <a:srcRect t="16822" r="1402" b="14678"/>
+          <a:stretch/>
+        </p:blipFill>
+        <p:spPr>
+          <a:xfrm>
+            <a:off x="1238188" y="1713385"/>
+            <a:ext cx="5916410" cy="360434"/>
+          </a:xfrm>
+          <a:prstGeom prst="rect">
+            <a:avLst/>
+          </a:prstGeom>
+        </p:spPr>
+      </p:pic>
+      <p:pic>
+        <p:nvPicPr>
+          <p:cNvPr id="6" name="Рисунок 5"/>
+          <p:cNvPicPr>
+            <a:picLocks noChangeAspect="1"/>
+          </p:cNvPicPr>
+          <p:nvPr/>
+        </p:nvPicPr>
+        <p:blipFill rotWithShape="1">
+          <a:blip r:embed="rId3"/>
+          <a:srcRect t="17860" b="-1"/>
+          <a:stretch/>
+        </p:blipFill>
+        <p:spPr>
+          <a:xfrm>
+            <a:off x="1238188" y="2251517"/>
+            <a:ext cx="9125184" cy="352725"/>
+          </a:xfrm>
+          <a:prstGeom prst="rect">
+            <a:avLst/>
+          </a:prstGeom>
+        </p:spPr>
+      </p:pic>
+      <p:pic>
+        <p:nvPicPr>
+          <p:cNvPr id="7" name="Рисунок 6"/>
+          <p:cNvPicPr>
+            <a:picLocks noChangeAspect="1"/>
+          </p:cNvPicPr>
+          <p:nvPr/>
+        </p:nvPicPr>
+        <p:blipFill rotWithShape="1">
+          <a:blip r:embed="rId4"/>
+          <a:srcRect t="7500" b="11563"/>
+          <a:stretch/>
+        </p:blipFill>
+        <p:spPr>
+          <a:xfrm>
+            <a:off x="1308556" y="2754852"/>
+            <a:ext cx="9405743" cy="352154"/>
+          </a:xfrm>
+          <a:prstGeom prst="rect">
+            <a:avLst/>
+          </a:prstGeom>
+        </p:spPr>
+      </p:pic>
+      <p:pic>
+        <p:nvPicPr>
+          <p:cNvPr id="8" name="Рисунок 7"/>
+          <p:cNvPicPr>
+            <a:picLocks noChangeAspect="1"/>
+          </p:cNvPicPr>
+          <p:nvPr/>
+        </p:nvPicPr>
+        <p:blipFill rotWithShape="1">
+          <a:blip r:embed="rId5"/>
+          <a:srcRect t="1" b="14724"/>
+          <a:stretch/>
+        </p:blipFill>
+        <p:spPr>
+          <a:xfrm>
+            <a:off x="1144359" y="3271110"/>
+            <a:ext cx="7481085" cy="326597"/>
+          </a:xfrm>
+          <a:prstGeom prst="rect">
+            <a:avLst/>
+          </a:prstGeom>
+        </p:spPr>
+      </p:pic>
+      <p:sp>
+        <p:nvSpPr>
+          <p:cNvPr id="9" name="TextBox 8"/>
+          <p:cNvSpPr txBox="1"/>
+          <p:nvPr/>
+        </p:nvSpPr>
+        <p:spPr>
+          <a:xfrm>
+            <a:off x="967689" y="1731575"/>
+            <a:ext cx="306494" cy="369332"/>
+          </a:xfrm>
+          <a:prstGeom prst="rect">
+            <a:avLst/>
+          </a:prstGeom>
+          <a:noFill/>
+        </p:spPr>
+        <p:txBody>
+          <a:bodyPr wrap="none" rtlCol="0">
+            <a:spAutoFit/>
+          </a:bodyPr>
+          <a:lstStyle/>
+          <a:p>
+            <a:r>
+              <a:rPr lang="en-US" dirty="0" smtClean="0"/>
+              <a:t>1</a:t>
+            </a:r>
+            <a:endParaRPr lang="en-US" dirty="0"/>
+          </a:p>
+        </p:txBody>
+      </p:sp>
+      <p:sp>
+        <p:nvSpPr>
+          <p:cNvPr id="10" name="TextBox 9"/>
+          <p:cNvSpPr txBox="1"/>
+          <p:nvPr/>
+        </p:nvSpPr>
+        <p:spPr>
+          <a:xfrm>
+            <a:off x="991112" y="2220493"/>
+            <a:ext cx="317444" cy="369332"/>
+          </a:xfrm>
+          <a:prstGeom prst="rect">
+            <a:avLst/>
+          </a:prstGeom>
+          <a:noFill/>
+        </p:spPr>
+        <p:txBody>
+          <a:bodyPr wrap="square" rtlCol="0">
+            <a:spAutoFit/>
+          </a:bodyPr>
+          <a:lstStyle/>
+          <a:p>
+            <a:r>
+              <a:rPr lang="en-US" dirty="0" smtClean="0"/>
+              <a:t>2</a:t>
+            </a:r>
+            <a:endParaRPr lang="en-US" dirty="0"/>
+          </a:p>
+        </p:txBody>
+      </p:sp>
+      <p:sp>
+        <p:nvSpPr>
+          <p:cNvPr id="11" name="TextBox 10"/>
+          <p:cNvSpPr txBox="1"/>
+          <p:nvPr/>
+        </p:nvSpPr>
+        <p:spPr>
+          <a:xfrm>
+            <a:off x="995123" y="2737422"/>
+            <a:ext cx="306494" cy="369332"/>
+          </a:xfrm>
+          <a:prstGeom prst="rect">
+            <a:avLst/>
+          </a:prstGeom>
+          <a:noFill/>
+        </p:spPr>
+        <p:txBody>
+          <a:bodyPr wrap="none" rtlCol="0">
+            <a:spAutoFit/>
+          </a:bodyPr>
+          <a:lstStyle/>
+          <a:p>
+            <a:r>
+              <a:rPr lang="en-US" dirty="0"/>
+              <a:t>3</a:t>
+            </a:r>
+            <a:endParaRPr lang="en-US" dirty="0"/>
+          </a:p>
+        </p:txBody>
+      </p:sp>
+      <p:sp>
+        <p:nvSpPr>
+          <p:cNvPr id="12" name="TextBox 11"/>
+          <p:cNvSpPr txBox="1"/>
+          <p:nvPr/>
+        </p:nvSpPr>
+        <p:spPr>
+          <a:xfrm>
+            <a:off x="995123" y="3282745"/>
+            <a:ext cx="306494" cy="369332"/>
+          </a:xfrm>
+          <a:prstGeom prst="rect">
+            <a:avLst/>
+          </a:prstGeom>
+          <a:noFill/>
+        </p:spPr>
+        <p:txBody>
+          <a:bodyPr wrap="none" rtlCol="0">
+            <a:spAutoFit/>
+          </a:bodyPr>
+          <a:lstStyle/>
+          <a:p>
+            <a:r>
+              <a:rPr lang="en-US" dirty="0" smtClean="0"/>
+              <a:t>4</a:t>
+            </a:r>
+            <a:endParaRPr lang="en-US" dirty="0"/>
+          </a:p>
+        </p:txBody>
+      </p:sp>
+      <p:sp>
+        <p:nvSpPr>
+          <p:cNvPr id="13" name="TextBox 12"/>
+          <p:cNvSpPr txBox="1"/>
+          <p:nvPr/>
+        </p:nvSpPr>
+        <p:spPr>
+          <a:xfrm>
+            <a:off x="4884901" y="3720690"/>
+            <a:ext cx="3147015" cy="338554"/>
+          </a:xfrm>
+          <a:prstGeom prst="rect">
+            <a:avLst/>
+          </a:prstGeom>
+          <a:noFill/>
+        </p:spPr>
+        <p:txBody>
+          <a:bodyPr wrap="none" rtlCol="0">
+            <a:spAutoFit/>
+          </a:bodyPr>
+          <a:lstStyle/>
+          <a:p>
+            <a:r>
+              <a:rPr lang="ru-RU" sz="1600" dirty="0" smtClean="0">
+                <a:solidFill>
+                  <a:schemeClr val="bg1">
+                    <a:lumMod val="65000"/>
+                  </a:schemeClr>
+                </a:solidFill>
+              </a:rPr>
+              <a:t>Аналогично для</a:t>
+            </a:r>
+            <a:r>
+              <a:rPr lang="en-US" sz="1600" dirty="0" smtClean="0">
+                <a:solidFill>
+                  <a:schemeClr val="bg1">
+                    <a:lumMod val="65000"/>
+                  </a:schemeClr>
+                </a:solidFill>
+              </a:rPr>
+              <a:t> operator new[]</a:t>
+            </a:r>
+            <a:endParaRPr lang="en-US" sz="1600" dirty="0">
+              <a:solidFill>
+                <a:schemeClr val="bg1">
+                  <a:lumMod val="65000"/>
+                </a:schemeClr>
+              </a:solidFill>
+            </a:endParaRPr>
+          </a:p>
+        </p:txBody>
+      </p:sp>
+      <p:sp>
+        <p:nvSpPr>
+          <p:cNvPr id="14" name="TextBox 13"/>
+          <p:cNvSpPr txBox="1"/>
+          <p:nvPr/>
+        </p:nvSpPr>
+        <p:spPr>
+          <a:xfrm>
+            <a:off x="10714299" y="2746263"/>
+            <a:ext cx="1136850" cy="369332"/>
+          </a:xfrm>
+          <a:prstGeom prst="rect">
+            <a:avLst/>
+          </a:prstGeom>
+          <a:solidFill>
+            <a:schemeClr val="bg1"/>
+          </a:solidFill>
+        </p:spPr>
+        <p:txBody>
+          <a:bodyPr wrap="none" rtlCol="0">
+            <a:spAutoFit/>
+          </a:bodyPr>
+          <a:lstStyle/>
+          <a:p>
+            <a:r>
+              <a:rPr lang="en-US" dirty="0" err="1" smtClean="0">
+                <a:solidFill>
+                  <a:srgbClr val="3333FF"/>
+                </a:solidFill>
+              </a:rPr>
+              <a:t>noexcept</a:t>
+            </a:r>
+            <a:endParaRPr lang="en-US" dirty="0">
+              <a:solidFill>
+                <a:srgbClr val="3333FF"/>
+              </a:solidFill>
+            </a:endParaRPr>
+          </a:p>
+        </p:txBody>
+      </p:sp>
+      <p:sp>
+        <p:nvSpPr>
+          <p:cNvPr id="15" name="TextBox 14"/>
+          <p:cNvSpPr txBox="1"/>
+          <p:nvPr/>
+        </p:nvSpPr>
+        <p:spPr>
+          <a:xfrm>
+            <a:off x="8546998" y="3257256"/>
+            <a:ext cx="1136850" cy="369332"/>
+          </a:xfrm>
+          <a:prstGeom prst="rect">
+            <a:avLst/>
+          </a:prstGeom>
+          <a:solidFill>
+            <a:schemeClr val="bg1"/>
+          </a:solidFill>
+        </p:spPr>
+        <p:txBody>
+          <a:bodyPr wrap="none" rtlCol="0">
+            <a:spAutoFit/>
+          </a:bodyPr>
+          <a:lstStyle/>
+          <a:p>
+            <a:r>
+              <a:rPr lang="en-US" dirty="0" err="1" smtClean="0">
+                <a:solidFill>
+                  <a:srgbClr val="3333FF"/>
+                </a:solidFill>
+              </a:rPr>
+              <a:t>noexcept</a:t>
+            </a:r>
+            <a:endParaRPr lang="en-US" dirty="0">
+              <a:solidFill>
+                <a:srgbClr val="3333FF"/>
+              </a:solidFill>
+            </a:endParaRPr>
+          </a:p>
+        </p:txBody>
+      </p:sp>
+      <p:sp>
+        <p:nvSpPr>
+          <p:cNvPr id="16" name="Объект 2"/>
+          <p:cNvSpPr txBox="1">
+            <a:spLocks/>
+          </p:cNvSpPr>
+          <p:nvPr/>
+        </p:nvSpPr>
+        <p:spPr>
+          <a:xfrm>
+            <a:off x="404897" y="913025"/>
+            <a:ext cx="11517744" cy="606615"/>
+          </a:xfrm>
+          <a:prstGeom prst="rect">
+            <a:avLst/>
+          </a:prstGeom>
+          <a:solidFill>
+            <a:schemeClr val="bg1"/>
+          </a:solidFill>
+        </p:spPr>
+        <p:txBody>
+          <a:bodyPr vert="horz" lIns="91440" tIns="45720" rIns="91440" bIns="45720" rtlCol="0">
+            <a:normAutofit/>
+          </a:bodyPr>
+          <a:lstStyle>
+            <a:lvl1pPr marL="342900" indent="-342900" algn="l" defTabSz="457200" rtl="0" eaLnBrk="1" latinLnBrk="0" hangingPunct="1">
+              <a:spcBef>
+                <a:spcPts val="1000"/>
+              </a:spcBef>
+              <a:spcAft>
+                <a:spcPts val="0"/>
+              </a:spcAft>
+              <a:buClr>
+                <a:schemeClr val="accent1"/>
+              </a:buClr>
+              <a:buSzPct val="80000"/>
+              <a:buFont typeface="Wingdings 3" charset="2"/>
+              <a:buChar char=""/>
+              <a:defRPr sz="1800" kern="1200">
+                <a:solidFill>
+                  <a:schemeClr val="tx1">
+                    <a:lumMod val="75000"/>
+                    <a:lumOff val="25000"/>
+                  </a:schemeClr>
+                </a:solidFill>
+                <a:latin typeface="+mn-lt"/>
+                <a:ea typeface="+mn-ea"/>
+                <a:cs typeface="+mn-cs"/>
+              </a:defRPr>
+            </a:lvl1pPr>
+            <a:lvl2pPr marL="742950" indent="-285750" algn="l" defTabSz="457200" rtl="0" eaLnBrk="1" latinLnBrk="0" hangingPunct="1">
+              <a:spcBef>
+                <a:spcPts val="1000"/>
+              </a:spcBef>
+              <a:spcAft>
+                <a:spcPts val="0"/>
+              </a:spcAft>
+              <a:buClr>
+                <a:schemeClr val="accent1"/>
+              </a:buClr>
+              <a:buSzPct val="80000"/>
+              <a:buFont typeface="Wingdings 3" charset="2"/>
+              <a:buChar char=""/>
+              <a:defRPr sz="1600" kern="1200">
+                <a:solidFill>
+                  <a:schemeClr val="tx1">
+                    <a:lumMod val="75000"/>
+                    <a:lumOff val="25000"/>
+                  </a:schemeClr>
+                </a:solidFill>
+                <a:latin typeface="+mn-lt"/>
+                <a:ea typeface="+mn-ea"/>
+                <a:cs typeface="+mn-cs"/>
+              </a:defRPr>
+            </a:lvl2pPr>
+            <a:lvl3pPr marL="1143000" indent="-228600" algn="l" defTabSz="457200" rtl="0" eaLnBrk="1" latinLnBrk="0" hangingPunct="1">
+              <a:spcBef>
+                <a:spcPts val="1000"/>
+              </a:spcBef>
+              <a:spcAft>
+                <a:spcPts val="0"/>
+              </a:spcAft>
+              <a:buClr>
+                <a:schemeClr val="accent1"/>
+              </a:buClr>
+              <a:buSzPct val="80000"/>
+              <a:buFont typeface="Wingdings 3" charset="2"/>
+              <a:buChar char=""/>
+              <a:defRPr sz="1400" kern="1200">
+                <a:solidFill>
+                  <a:schemeClr val="tx1">
+                    <a:lumMod val="75000"/>
+                    <a:lumOff val="25000"/>
+                  </a:schemeClr>
+                </a:solidFill>
+                <a:latin typeface="+mn-lt"/>
+                <a:ea typeface="+mn-ea"/>
+                <a:cs typeface="+mn-cs"/>
+              </a:defRPr>
+            </a:lvl3pPr>
+            <a:lvl4pPr marL="1600200" indent="-228600" algn="l" defTabSz="457200" rtl="0" eaLnBrk="1" latinLnBrk="0" hangingPunct="1">
+              <a:spcBef>
+                <a:spcPts val="1000"/>
+              </a:spcBef>
+              <a:spcAft>
+                <a:spcPts val="0"/>
+              </a:spcAft>
+              <a:buClr>
+                <a:schemeClr val="accent1"/>
+              </a:buClr>
+              <a:buSzPct val="80000"/>
+              <a:buFont typeface="Wingdings 3" charset="2"/>
+              <a:buChar char=""/>
+              <a:defRPr sz="1200" kern="1200">
+                <a:solidFill>
+                  <a:schemeClr val="tx1">
+                    <a:lumMod val="75000"/>
+                    <a:lumOff val="25000"/>
+                  </a:schemeClr>
+                </a:solidFill>
+                <a:latin typeface="+mn-lt"/>
+                <a:ea typeface="+mn-ea"/>
+                <a:cs typeface="+mn-cs"/>
+              </a:defRPr>
+            </a:lvl4pPr>
+            <a:lvl5pPr marL="2057400" indent="-228600" algn="l" defTabSz="457200" rtl="0" eaLnBrk="1" latinLnBrk="0" hangingPunct="1">
+              <a:spcBef>
+                <a:spcPts val="1000"/>
+              </a:spcBef>
+              <a:spcAft>
+                <a:spcPts val="0"/>
+              </a:spcAft>
+              <a:buClr>
+                <a:schemeClr val="accent1"/>
+              </a:buClr>
+              <a:buSzPct val="80000"/>
+              <a:buFont typeface="Wingdings 3" charset="2"/>
+              <a:buChar char=""/>
+              <a:defRPr sz="1200" kern="1200">
+                <a:solidFill>
+                  <a:schemeClr val="tx1">
+                    <a:lumMod val="75000"/>
+                    <a:lumOff val="25000"/>
+                  </a:schemeClr>
+                </a:solidFill>
+                <a:latin typeface="+mn-lt"/>
+                <a:ea typeface="+mn-ea"/>
+                <a:cs typeface="+mn-cs"/>
+              </a:defRPr>
+            </a:lvl5pPr>
+            <a:lvl6pPr marL="2514600" indent="-228600" algn="l" defTabSz="457200" rtl="0" eaLnBrk="1" latinLnBrk="0" hangingPunct="1">
+              <a:spcBef>
+                <a:spcPts val="1000"/>
+              </a:spcBef>
+              <a:spcAft>
+                <a:spcPts val="0"/>
+              </a:spcAft>
+              <a:buClr>
+                <a:schemeClr val="accent1"/>
+              </a:buClr>
+              <a:buSzPct val="80000"/>
+              <a:buFont typeface="Wingdings 3" charset="2"/>
+              <a:buChar char=""/>
+              <a:defRPr sz="1200" kern="1200">
+                <a:solidFill>
+                  <a:schemeClr val="tx1">
+                    <a:lumMod val="75000"/>
+                    <a:lumOff val="25000"/>
+                  </a:schemeClr>
+                </a:solidFill>
+                <a:latin typeface="+mn-lt"/>
+                <a:ea typeface="+mn-ea"/>
+                <a:cs typeface="+mn-cs"/>
+              </a:defRPr>
+            </a:lvl6pPr>
+            <a:lvl7pPr marL="2971800" indent="-228600" algn="l" defTabSz="457200" rtl="0" eaLnBrk="1" latinLnBrk="0" hangingPunct="1">
+              <a:spcBef>
+                <a:spcPts val="1000"/>
+              </a:spcBef>
+              <a:spcAft>
+                <a:spcPts val="0"/>
+              </a:spcAft>
+              <a:buClr>
+                <a:schemeClr val="accent1"/>
+              </a:buClr>
+              <a:buSzPct val="80000"/>
+              <a:buFont typeface="Wingdings 3" charset="2"/>
+              <a:buChar char=""/>
+              <a:defRPr sz="1200" kern="1200">
+                <a:solidFill>
+                  <a:schemeClr val="tx1">
+                    <a:lumMod val="75000"/>
+                    <a:lumOff val="25000"/>
+                  </a:schemeClr>
+                </a:solidFill>
+                <a:latin typeface="+mn-lt"/>
+                <a:ea typeface="+mn-ea"/>
+                <a:cs typeface="+mn-cs"/>
+              </a:defRPr>
+            </a:lvl7pPr>
+            <a:lvl8pPr marL="3429000" indent="-228600" algn="l" defTabSz="457200" rtl="0" eaLnBrk="1" latinLnBrk="0" hangingPunct="1">
+              <a:spcBef>
+                <a:spcPts val="1000"/>
+              </a:spcBef>
+              <a:spcAft>
+                <a:spcPts val="0"/>
+              </a:spcAft>
+              <a:buClr>
+                <a:schemeClr val="accent1"/>
+              </a:buClr>
+              <a:buSzPct val="80000"/>
+              <a:buFont typeface="Wingdings 3" charset="2"/>
+              <a:buChar char=""/>
+              <a:defRPr sz="1200" kern="1200">
+                <a:solidFill>
+                  <a:schemeClr val="tx1">
+                    <a:lumMod val="75000"/>
+                    <a:lumOff val="25000"/>
+                  </a:schemeClr>
+                </a:solidFill>
+                <a:latin typeface="+mn-lt"/>
+                <a:ea typeface="+mn-ea"/>
+                <a:cs typeface="+mn-cs"/>
+              </a:defRPr>
+            </a:lvl8pPr>
+            <a:lvl9pPr marL="3886200" indent="-228600" algn="l" defTabSz="457200" rtl="0" eaLnBrk="1" latinLnBrk="0" hangingPunct="1">
+              <a:spcBef>
+                <a:spcPts val="1000"/>
+              </a:spcBef>
+              <a:spcAft>
+                <a:spcPts val="0"/>
+              </a:spcAft>
+              <a:buClr>
+                <a:schemeClr val="accent1"/>
+              </a:buClr>
+              <a:buSzPct val="80000"/>
+              <a:buFont typeface="Wingdings 3" charset="2"/>
+              <a:buChar char=""/>
+              <a:defRPr sz="1200" kern="1200">
+                <a:solidFill>
+                  <a:schemeClr val="tx1">
+                    <a:lumMod val="75000"/>
+                    <a:lumOff val="25000"/>
+                  </a:schemeClr>
+                </a:solidFill>
+                <a:latin typeface="+mn-lt"/>
+                <a:ea typeface="+mn-ea"/>
+                <a:cs typeface="+mn-cs"/>
+              </a:defRPr>
+            </a:lvl9pPr>
+          </a:lstStyle>
+          <a:p>
+            <a:pPr>
+              <a:buFont typeface="Wingdings" panose="05000000000000000000" pitchFamily="2" charset="2"/>
+              <a:buChar char="Ø"/>
+            </a:pPr>
+            <a:r>
+              <a:rPr lang="ru-RU" dirty="0" smtClean="0"/>
+              <a:t>Пример использования: подсчёт </a:t>
+            </a:r>
+            <a:r>
+              <a:rPr lang="ru-RU" dirty="0" err="1" smtClean="0"/>
+              <a:t>аллокаций</a:t>
+            </a:r>
+            <a:r>
+              <a:rPr lang="ru-RU" dirty="0" smtClean="0"/>
+              <a:t> и </a:t>
+            </a:r>
+            <a:r>
+              <a:rPr lang="ru-RU" dirty="0" err="1" smtClean="0"/>
+              <a:t>деаллокаций</a:t>
+            </a:r>
+            <a:r>
+              <a:rPr lang="ru-RU" dirty="0" smtClean="0"/>
+              <a:t> для выявления утечек памяти</a:t>
+            </a:r>
+          </a:p>
+        </p:txBody>
+      </p:sp>
+    </p:spTree>
+    <p:extLst>
+      <p:ext uri="{BB962C8B-B14F-4D97-AF65-F5344CB8AC3E}">
+        <p14:creationId xmlns:p14="http://schemas.microsoft.com/office/powerpoint/2010/main" val="2627843014"/>
+      </p:ext>
+    </p:extLst>
+  </p:cSld>
+  <p:clrMapOvr>
+    <a:masterClrMapping/>
+  </p:clrMapOvr>
+</p:sld>
+</file>
+
+<file path=ppt/slides/slide13.xml><?xml version="1.0" encoding="utf-8"?>
+<p:sld xmlns:a="http://schemas.openxmlformats.org/drawingml/2006/main" xmlns:r="http://schemas.openxmlformats.org/officeDocument/2006/relationships" xmlns:p="http://schemas.openxmlformats.org/presentationml/2006/main">
+  <p:cSld>
+    <p:spTree>
+      <p:nvGrpSpPr>
+        <p:cNvPr id="1" name=""/>
+        <p:cNvGrpSpPr/>
+        <p:nvPr/>
+      </p:nvGrpSpPr>
+      <p:grpSpPr>
+        <a:xfrm>
+          <a:off x="0" y="0"/>
+          <a:ext cx="0" cy="0"/>
+          <a:chOff x="0" y="0"/>
+          <a:chExt cx="0" cy="0"/>
+        </a:xfrm>
+      </p:grpSpPr>
+      <p:sp>
+        <p:nvSpPr>
+          <p:cNvPr id="22" name="Прямоугольник 21"/>
+          <p:cNvSpPr/>
+          <p:nvPr/>
+        </p:nvSpPr>
+        <p:spPr>
+          <a:xfrm>
+            <a:off x="404897" y="975829"/>
+            <a:ext cx="11517744" cy="5644928"/>
+          </a:xfrm>
+          <a:prstGeom prst="rect">
+            <a:avLst/>
+          </a:prstGeom>
+          <a:ln>
+            <a:solidFill>
+              <a:schemeClr val="bg1"/>
+            </a:solidFill>
+          </a:ln>
+        </p:spPr>
+        <p:style>
+          <a:lnRef idx="2">
+            <a:schemeClr val="accent6"/>
+          </a:lnRef>
+          <a:fillRef idx="1">
+            <a:schemeClr val="lt1"/>
+          </a:fillRef>
+          <a:effectRef idx="0">
+            <a:schemeClr val="accent6"/>
+          </a:effectRef>
+          <a:fontRef idx="minor">
+            <a:schemeClr val="dk1"/>
+          </a:fontRef>
+        </p:style>
+        <p:txBody>
+          <a:bodyPr rtlCol="0" anchor="ctr"/>
+          <a:lstStyle/>
+          <a:p>
+            <a:pPr algn="ctr"/>
+            <a:endParaRPr lang="en-US"/>
+          </a:p>
+        </p:txBody>
+      </p:sp>
+      <p:sp>
+        <p:nvSpPr>
+          <p:cNvPr id="3" name="Объект 2"/>
+          <p:cNvSpPr>
+            <a:spLocks noGrp="1"/>
+          </p:cNvSpPr>
+          <p:nvPr>
+            <p:ph idx="1"/>
+          </p:nvPr>
+        </p:nvSpPr>
+        <p:spPr>
+          <a:xfrm>
+            <a:off x="404897" y="1733245"/>
+            <a:ext cx="11517744" cy="491796"/>
+          </a:xfrm>
+          <a:solidFill>
+            <a:schemeClr val="bg1"/>
+          </a:solidFill>
+        </p:spPr>
+        <p:txBody>
+          <a:bodyPr/>
+          <a:lstStyle/>
+          <a:p>
+            <a:pPr marL="0" indent="0">
+              <a:buNone/>
+            </a:pPr>
+            <a:r>
+              <a:rPr lang="ru-RU" dirty="0" smtClean="0"/>
+              <a:t>Выделяет новую область в памяти при помощи </a:t>
+            </a:r>
+            <a:r>
+              <a:rPr lang="en-US" dirty="0" smtClean="0"/>
+              <a:t>operator new </a:t>
+            </a:r>
+            <a:r>
+              <a:rPr lang="ru-RU" dirty="0" smtClean="0"/>
+              <a:t>и создаёт в ней объект</a:t>
+            </a:r>
+            <a:endParaRPr lang="en-US" dirty="0"/>
+          </a:p>
+        </p:txBody>
+      </p:sp>
+      <p:sp>
+        <p:nvSpPr>
+          <p:cNvPr id="4" name="Title 1">
+            <a:extLst>
+              <a:ext uri="{FF2B5EF4-FFF2-40B4-BE49-F238E27FC236}">
+                <a16:creationId xmlns:a16="http://schemas.microsoft.com/office/drawing/2014/main" xmlns="" id="{ECF0BCE9-3024-43A2-BA59-C2729B585737}"/>
+              </a:ext>
+            </a:extLst>
+          </p:cNvPr>
+          <p:cNvSpPr>
+            <a:spLocks noGrp="1"/>
+          </p:cNvSpPr>
+          <p:nvPr>
+            <p:ph type="title"/>
+          </p:nvPr>
+        </p:nvSpPr>
+        <p:spPr>
+          <a:xfrm>
+            <a:off x="404897" y="175616"/>
+            <a:ext cx="11517744" cy="628335"/>
+          </a:xfrm>
+          <a:solidFill>
+            <a:schemeClr val="bg1"/>
+          </a:solidFill>
+          <a:ln>
+            <a:solidFill>
+              <a:schemeClr val="tx1"/>
+            </a:solidFill>
+          </a:ln>
+        </p:spPr>
+        <p:txBody>
+          <a:bodyPr>
+            <a:noAutofit/>
+          </a:bodyPr>
+          <a:lstStyle/>
+          <a:p>
+            <a:pPr algn="ctr"/>
+            <a:r>
+              <a:rPr lang="en-US" sz="2800" dirty="0" smtClean="0"/>
+              <a:t>placement-</a:t>
+            </a:r>
+            <a:r>
+              <a:rPr lang="en-US" sz="2800" dirty="0" smtClean="0"/>
+              <a:t>new</a:t>
+            </a:r>
+            <a:endParaRPr lang="en-US" sz="2800" dirty="0"/>
+          </a:p>
+        </p:txBody>
+      </p:sp>
+      <p:sp>
+        <p:nvSpPr>
+          <p:cNvPr id="11" name="Объект 2"/>
+          <p:cNvSpPr txBox="1">
+            <a:spLocks/>
+          </p:cNvSpPr>
+          <p:nvPr/>
+        </p:nvSpPr>
+        <p:spPr>
+          <a:xfrm>
+            <a:off x="404897" y="975829"/>
+            <a:ext cx="11517744" cy="757415"/>
+          </a:xfrm>
+          <a:prstGeom prst="rect">
+            <a:avLst/>
+          </a:prstGeom>
+          <a:solidFill>
+            <a:schemeClr val="bg1"/>
+          </a:solidFill>
+        </p:spPr>
+        <p:txBody>
+          <a:bodyPr vert="horz" lIns="91440" tIns="45720" rIns="91440" bIns="45720" rtlCol="0">
+            <a:normAutofit/>
+          </a:bodyPr>
+          <a:lstStyle>
+            <a:lvl1pPr marL="342900" indent="-342900" algn="l" defTabSz="457200" rtl="0" eaLnBrk="1" latinLnBrk="0" hangingPunct="1">
+              <a:spcBef>
+                <a:spcPts val="1000"/>
+              </a:spcBef>
+              <a:spcAft>
+                <a:spcPts val="0"/>
+              </a:spcAft>
+              <a:buClr>
+                <a:schemeClr val="accent1"/>
+              </a:buClr>
+              <a:buSzPct val="80000"/>
+              <a:buFont typeface="Wingdings 3" charset="2"/>
+              <a:buChar char=""/>
+              <a:defRPr sz="1800" kern="1200">
+                <a:solidFill>
+                  <a:schemeClr val="tx1">
+                    <a:lumMod val="75000"/>
+                    <a:lumOff val="25000"/>
+                  </a:schemeClr>
+                </a:solidFill>
+                <a:latin typeface="+mn-lt"/>
+                <a:ea typeface="+mn-ea"/>
+                <a:cs typeface="+mn-cs"/>
+              </a:defRPr>
+            </a:lvl1pPr>
+            <a:lvl2pPr marL="742950" indent="-285750" algn="l" defTabSz="457200" rtl="0" eaLnBrk="1" latinLnBrk="0" hangingPunct="1">
+              <a:spcBef>
+                <a:spcPts val="1000"/>
+              </a:spcBef>
+              <a:spcAft>
+                <a:spcPts val="0"/>
+              </a:spcAft>
+              <a:buClr>
+                <a:schemeClr val="accent1"/>
+              </a:buClr>
+              <a:buSzPct val="80000"/>
+              <a:buFont typeface="Wingdings 3" charset="2"/>
+              <a:buChar char=""/>
+              <a:defRPr sz="1600" kern="1200">
+                <a:solidFill>
+                  <a:schemeClr val="tx1">
+                    <a:lumMod val="75000"/>
+                    <a:lumOff val="25000"/>
+                  </a:schemeClr>
+                </a:solidFill>
+                <a:latin typeface="+mn-lt"/>
+                <a:ea typeface="+mn-ea"/>
+                <a:cs typeface="+mn-cs"/>
+              </a:defRPr>
+            </a:lvl2pPr>
+            <a:lvl3pPr marL="1143000" indent="-228600" algn="l" defTabSz="457200" rtl="0" eaLnBrk="1" latinLnBrk="0" hangingPunct="1">
+              <a:spcBef>
+                <a:spcPts val="1000"/>
+              </a:spcBef>
+              <a:spcAft>
+                <a:spcPts val="0"/>
+              </a:spcAft>
+              <a:buClr>
+                <a:schemeClr val="accent1"/>
+              </a:buClr>
+              <a:buSzPct val="80000"/>
+              <a:buFont typeface="Wingdings 3" charset="2"/>
+              <a:buChar char=""/>
+              <a:defRPr sz="1400" kern="1200">
+                <a:solidFill>
+                  <a:schemeClr val="tx1">
+                    <a:lumMod val="75000"/>
+                    <a:lumOff val="25000"/>
+                  </a:schemeClr>
+                </a:solidFill>
+                <a:latin typeface="+mn-lt"/>
+                <a:ea typeface="+mn-ea"/>
+                <a:cs typeface="+mn-cs"/>
+              </a:defRPr>
+            </a:lvl3pPr>
+            <a:lvl4pPr marL="1600200" indent="-228600" algn="l" defTabSz="457200" rtl="0" eaLnBrk="1" latinLnBrk="0" hangingPunct="1">
+              <a:spcBef>
+                <a:spcPts val="1000"/>
+              </a:spcBef>
+              <a:spcAft>
+                <a:spcPts val="0"/>
+              </a:spcAft>
+              <a:buClr>
+                <a:schemeClr val="accent1"/>
+              </a:buClr>
+              <a:buSzPct val="80000"/>
+              <a:buFont typeface="Wingdings 3" charset="2"/>
+              <a:buChar char=""/>
+              <a:defRPr sz="1200" kern="1200">
+                <a:solidFill>
+                  <a:schemeClr val="tx1">
+                    <a:lumMod val="75000"/>
+                    <a:lumOff val="25000"/>
+                  </a:schemeClr>
+                </a:solidFill>
+                <a:latin typeface="+mn-lt"/>
+                <a:ea typeface="+mn-ea"/>
+                <a:cs typeface="+mn-cs"/>
+              </a:defRPr>
+            </a:lvl4pPr>
+            <a:lvl5pPr marL="2057400" indent="-228600" algn="l" defTabSz="457200" rtl="0" eaLnBrk="1" latinLnBrk="0" hangingPunct="1">
+              <a:spcBef>
+                <a:spcPts val="1000"/>
+              </a:spcBef>
+              <a:spcAft>
+                <a:spcPts val="0"/>
+              </a:spcAft>
+              <a:buClr>
+                <a:schemeClr val="accent1"/>
+              </a:buClr>
+              <a:buSzPct val="80000"/>
+              <a:buFont typeface="Wingdings 3" charset="2"/>
+              <a:buChar char=""/>
+              <a:defRPr sz="1200" kern="1200">
+                <a:solidFill>
+                  <a:schemeClr val="tx1">
+                    <a:lumMod val="75000"/>
+                    <a:lumOff val="25000"/>
+                  </a:schemeClr>
+                </a:solidFill>
+                <a:latin typeface="+mn-lt"/>
+                <a:ea typeface="+mn-ea"/>
+                <a:cs typeface="+mn-cs"/>
+              </a:defRPr>
+            </a:lvl5pPr>
+            <a:lvl6pPr marL="2514600" indent="-228600" algn="l" defTabSz="457200" rtl="0" eaLnBrk="1" latinLnBrk="0" hangingPunct="1">
+              <a:spcBef>
+                <a:spcPts val="1000"/>
+              </a:spcBef>
+              <a:spcAft>
+                <a:spcPts val="0"/>
+              </a:spcAft>
+              <a:buClr>
+                <a:schemeClr val="accent1"/>
+              </a:buClr>
+              <a:buSzPct val="80000"/>
+              <a:buFont typeface="Wingdings 3" charset="2"/>
+              <a:buChar char=""/>
+              <a:defRPr sz="1200" kern="1200">
+                <a:solidFill>
+                  <a:schemeClr val="tx1">
+                    <a:lumMod val="75000"/>
+                    <a:lumOff val="25000"/>
+                  </a:schemeClr>
+                </a:solidFill>
+                <a:latin typeface="+mn-lt"/>
+                <a:ea typeface="+mn-ea"/>
+                <a:cs typeface="+mn-cs"/>
+              </a:defRPr>
+            </a:lvl6pPr>
+            <a:lvl7pPr marL="2971800" indent="-228600" algn="l" defTabSz="457200" rtl="0" eaLnBrk="1" latinLnBrk="0" hangingPunct="1">
+              <a:spcBef>
+                <a:spcPts val="1000"/>
+              </a:spcBef>
+              <a:spcAft>
+                <a:spcPts val="0"/>
+              </a:spcAft>
+              <a:buClr>
+                <a:schemeClr val="accent1"/>
+              </a:buClr>
+              <a:buSzPct val="80000"/>
+              <a:buFont typeface="Wingdings 3" charset="2"/>
+              <a:buChar char=""/>
+              <a:defRPr sz="1200" kern="1200">
+                <a:solidFill>
+                  <a:schemeClr val="tx1">
+                    <a:lumMod val="75000"/>
+                    <a:lumOff val="25000"/>
+                  </a:schemeClr>
+                </a:solidFill>
+                <a:latin typeface="+mn-lt"/>
+                <a:ea typeface="+mn-ea"/>
+                <a:cs typeface="+mn-cs"/>
+              </a:defRPr>
+            </a:lvl7pPr>
+            <a:lvl8pPr marL="3429000" indent="-228600" algn="l" defTabSz="457200" rtl="0" eaLnBrk="1" latinLnBrk="0" hangingPunct="1">
+              <a:spcBef>
+                <a:spcPts val="1000"/>
+              </a:spcBef>
+              <a:spcAft>
+                <a:spcPts val="0"/>
+              </a:spcAft>
+              <a:buClr>
+                <a:schemeClr val="accent1"/>
+              </a:buClr>
+              <a:buSzPct val="80000"/>
+              <a:buFont typeface="Wingdings 3" charset="2"/>
+              <a:buChar char=""/>
+              <a:defRPr sz="1200" kern="1200">
+                <a:solidFill>
+                  <a:schemeClr val="tx1">
+                    <a:lumMod val="75000"/>
+                    <a:lumOff val="25000"/>
+                  </a:schemeClr>
+                </a:solidFill>
+                <a:latin typeface="+mn-lt"/>
+                <a:ea typeface="+mn-ea"/>
+                <a:cs typeface="+mn-cs"/>
+              </a:defRPr>
+            </a:lvl8pPr>
+            <a:lvl9pPr marL="3886200" indent="-228600" algn="l" defTabSz="457200" rtl="0" eaLnBrk="1" latinLnBrk="0" hangingPunct="1">
+              <a:spcBef>
+                <a:spcPts val="1000"/>
+              </a:spcBef>
+              <a:spcAft>
+                <a:spcPts val="0"/>
+              </a:spcAft>
+              <a:buClr>
+                <a:schemeClr val="accent1"/>
+              </a:buClr>
+              <a:buSzPct val="80000"/>
+              <a:buFont typeface="Wingdings 3" charset="2"/>
+              <a:buChar char=""/>
+              <a:defRPr sz="1200" kern="1200">
+                <a:solidFill>
+                  <a:schemeClr val="tx1">
+                    <a:lumMod val="75000"/>
+                    <a:lumOff val="25000"/>
+                  </a:schemeClr>
+                </a:solidFill>
+                <a:latin typeface="+mn-lt"/>
+                <a:ea typeface="+mn-ea"/>
+                <a:cs typeface="+mn-cs"/>
+              </a:defRPr>
+            </a:lvl9pPr>
+          </a:lstStyle>
+          <a:p>
+            <a:r>
+              <a:rPr lang="ru-RU" dirty="0"/>
+              <a:t>Стандартная инструкция </a:t>
+            </a:r>
+            <a:r>
+              <a:rPr lang="en-US" dirty="0" smtClean="0"/>
+              <a:t>new</a:t>
+            </a:r>
+            <a:r>
+              <a:rPr lang="ru-RU" dirty="0" smtClean="0"/>
+              <a:t>: </a:t>
+            </a:r>
+            <a:endParaRPr lang="en-US" dirty="0"/>
+          </a:p>
+        </p:txBody>
+      </p:sp>
+      <p:pic>
+        <p:nvPicPr>
+          <p:cNvPr id="12" name="Рисунок 11"/>
+          <p:cNvPicPr>
+            <a:picLocks noChangeAspect="1"/>
+          </p:cNvPicPr>
+          <p:nvPr/>
+        </p:nvPicPr>
+        <p:blipFill>
+          <a:blip r:embed="rId2"/>
+          <a:stretch>
+            <a:fillRect/>
+          </a:stretch>
+        </p:blipFill>
+        <p:spPr>
+          <a:xfrm>
+            <a:off x="4321509" y="1093125"/>
+            <a:ext cx="2679915" cy="473722"/>
+          </a:xfrm>
+          <a:prstGeom prst="rect">
+            <a:avLst/>
+          </a:prstGeom>
+        </p:spPr>
+      </p:pic>
+      <p:sp>
+        <p:nvSpPr>
+          <p:cNvPr id="13" name="Объект 2"/>
+          <p:cNvSpPr txBox="1">
+            <a:spLocks/>
+          </p:cNvSpPr>
+          <p:nvPr/>
+        </p:nvSpPr>
+        <p:spPr>
+          <a:xfrm>
+            <a:off x="535208" y="2575300"/>
+            <a:ext cx="11387433" cy="703255"/>
+          </a:xfrm>
+          <a:prstGeom prst="rect">
+            <a:avLst/>
+          </a:prstGeom>
+          <a:solidFill>
+            <a:schemeClr val="bg1"/>
+          </a:solidFill>
+        </p:spPr>
+        <p:txBody>
+          <a:bodyPr vert="horz" lIns="91440" tIns="45720" rIns="91440" bIns="45720" rtlCol="0">
+            <a:normAutofit/>
+          </a:bodyPr>
+          <a:lstStyle>
+            <a:lvl1pPr marL="342900" indent="-342900" algn="l" defTabSz="457200" rtl="0" eaLnBrk="1" latinLnBrk="0" hangingPunct="1">
+              <a:spcBef>
+                <a:spcPts val="1000"/>
+              </a:spcBef>
+              <a:spcAft>
+                <a:spcPts val="0"/>
+              </a:spcAft>
+              <a:buClr>
+                <a:schemeClr val="accent1"/>
+              </a:buClr>
+              <a:buSzPct val="80000"/>
+              <a:buFont typeface="Wingdings 3" charset="2"/>
+              <a:buChar char=""/>
+              <a:defRPr sz="1800" kern="1200">
+                <a:solidFill>
+                  <a:schemeClr val="tx1">
+                    <a:lumMod val="75000"/>
+                    <a:lumOff val="25000"/>
+                  </a:schemeClr>
+                </a:solidFill>
+                <a:latin typeface="+mn-lt"/>
+                <a:ea typeface="+mn-ea"/>
+                <a:cs typeface="+mn-cs"/>
+              </a:defRPr>
+            </a:lvl1pPr>
+            <a:lvl2pPr marL="742950" indent="-285750" algn="l" defTabSz="457200" rtl="0" eaLnBrk="1" latinLnBrk="0" hangingPunct="1">
+              <a:spcBef>
+                <a:spcPts val="1000"/>
+              </a:spcBef>
+              <a:spcAft>
+                <a:spcPts val="0"/>
+              </a:spcAft>
+              <a:buClr>
+                <a:schemeClr val="accent1"/>
+              </a:buClr>
+              <a:buSzPct val="80000"/>
+              <a:buFont typeface="Wingdings 3" charset="2"/>
+              <a:buChar char=""/>
+              <a:defRPr sz="1600" kern="1200">
+                <a:solidFill>
+                  <a:schemeClr val="tx1">
+                    <a:lumMod val="75000"/>
+                    <a:lumOff val="25000"/>
+                  </a:schemeClr>
+                </a:solidFill>
+                <a:latin typeface="+mn-lt"/>
+                <a:ea typeface="+mn-ea"/>
+                <a:cs typeface="+mn-cs"/>
+              </a:defRPr>
+            </a:lvl2pPr>
+            <a:lvl3pPr marL="1143000" indent="-228600" algn="l" defTabSz="457200" rtl="0" eaLnBrk="1" latinLnBrk="0" hangingPunct="1">
+              <a:spcBef>
+                <a:spcPts val="1000"/>
+              </a:spcBef>
+              <a:spcAft>
+                <a:spcPts val="0"/>
+              </a:spcAft>
+              <a:buClr>
+                <a:schemeClr val="accent1"/>
+              </a:buClr>
+              <a:buSzPct val="80000"/>
+              <a:buFont typeface="Wingdings 3" charset="2"/>
+              <a:buChar char=""/>
+              <a:defRPr sz="1400" kern="1200">
+                <a:solidFill>
+                  <a:schemeClr val="tx1">
+                    <a:lumMod val="75000"/>
+                    <a:lumOff val="25000"/>
+                  </a:schemeClr>
+                </a:solidFill>
+                <a:latin typeface="+mn-lt"/>
+                <a:ea typeface="+mn-ea"/>
+                <a:cs typeface="+mn-cs"/>
+              </a:defRPr>
+            </a:lvl3pPr>
+            <a:lvl4pPr marL="1600200" indent="-228600" algn="l" defTabSz="457200" rtl="0" eaLnBrk="1" latinLnBrk="0" hangingPunct="1">
+              <a:spcBef>
+                <a:spcPts val="1000"/>
+              </a:spcBef>
+              <a:spcAft>
+                <a:spcPts val="0"/>
+              </a:spcAft>
+              <a:buClr>
+                <a:schemeClr val="accent1"/>
+              </a:buClr>
+              <a:buSzPct val="80000"/>
+              <a:buFont typeface="Wingdings 3" charset="2"/>
+              <a:buChar char=""/>
+              <a:defRPr sz="1200" kern="1200">
+                <a:solidFill>
+                  <a:schemeClr val="tx1">
+                    <a:lumMod val="75000"/>
+                    <a:lumOff val="25000"/>
+                  </a:schemeClr>
+                </a:solidFill>
+                <a:latin typeface="+mn-lt"/>
+                <a:ea typeface="+mn-ea"/>
+                <a:cs typeface="+mn-cs"/>
+              </a:defRPr>
+            </a:lvl4pPr>
+            <a:lvl5pPr marL="2057400" indent="-228600" algn="l" defTabSz="457200" rtl="0" eaLnBrk="1" latinLnBrk="0" hangingPunct="1">
+              <a:spcBef>
+                <a:spcPts val="1000"/>
+              </a:spcBef>
+              <a:spcAft>
+                <a:spcPts val="0"/>
+              </a:spcAft>
+              <a:buClr>
+                <a:schemeClr val="accent1"/>
+              </a:buClr>
+              <a:buSzPct val="80000"/>
+              <a:buFont typeface="Wingdings 3" charset="2"/>
+              <a:buChar char=""/>
+              <a:defRPr sz="1200" kern="1200">
+                <a:solidFill>
+                  <a:schemeClr val="tx1">
+                    <a:lumMod val="75000"/>
+                    <a:lumOff val="25000"/>
+                  </a:schemeClr>
+                </a:solidFill>
+                <a:latin typeface="+mn-lt"/>
+                <a:ea typeface="+mn-ea"/>
+                <a:cs typeface="+mn-cs"/>
+              </a:defRPr>
+            </a:lvl5pPr>
+            <a:lvl6pPr marL="2514600" indent="-228600" algn="l" defTabSz="457200" rtl="0" eaLnBrk="1" latinLnBrk="0" hangingPunct="1">
+              <a:spcBef>
+                <a:spcPts val="1000"/>
+              </a:spcBef>
+              <a:spcAft>
+                <a:spcPts val="0"/>
+              </a:spcAft>
+              <a:buClr>
+                <a:schemeClr val="accent1"/>
+              </a:buClr>
+              <a:buSzPct val="80000"/>
+              <a:buFont typeface="Wingdings 3" charset="2"/>
+              <a:buChar char=""/>
+              <a:defRPr sz="1200" kern="1200">
+                <a:solidFill>
+                  <a:schemeClr val="tx1">
+                    <a:lumMod val="75000"/>
+                    <a:lumOff val="25000"/>
+                  </a:schemeClr>
+                </a:solidFill>
+                <a:latin typeface="+mn-lt"/>
+                <a:ea typeface="+mn-ea"/>
+                <a:cs typeface="+mn-cs"/>
+              </a:defRPr>
+            </a:lvl6pPr>
+            <a:lvl7pPr marL="2971800" indent="-228600" algn="l" defTabSz="457200" rtl="0" eaLnBrk="1" latinLnBrk="0" hangingPunct="1">
+              <a:spcBef>
+                <a:spcPts val="1000"/>
+              </a:spcBef>
+              <a:spcAft>
+                <a:spcPts val="0"/>
+              </a:spcAft>
+              <a:buClr>
+                <a:schemeClr val="accent1"/>
+              </a:buClr>
+              <a:buSzPct val="80000"/>
+              <a:buFont typeface="Wingdings 3" charset="2"/>
+              <a:buChar char=""/>
+              <a:defRPr sz="1200" kern="1200">
+                <a:solidFill>
+                  <a:schemeClr val="tx1">
+                    <a:lumMod val="75000"/>
+                    <a:lumOff val="25000"/>
+                  </a:schemeClr>
+                </a:solidFill>
+                <a:latin typeface="+mn-lt"/>
+                <a:ea typeface="+mn-ea"/>
+                <a:cs typeface="+mn-cs"/>
+              </a:defRPr>
+            </a:lvl7pPr>
+            <a:lvl8pPr marL="3429000" indent="-228600" algn="l" defTabSz="457200" rtl="0" eaLnBrk="1" latinLnBrk="0" hangingPunct="1">
+              <a:spcBef>
+                <a:spcPts val="1000"/>
+              </a:spcBef>
+              <a:spcAft>
+                <a:spcPts val="0"/>
+              </a:spcAft>
+              <a:buClr>
+                <a:schemeClr val="accent1"/>
+              </a:buClr>
+              <a:buSzPct val="80000"/>
+              <a:buFont typeface="Wingdings 3" charset="2"/>
+              <a:buChar char=""/>
+              <a:defRPr sz="1200" kern="1200">
+                <a:solidFill>
+                  <a:schemeClr val="tx1">
+                    <a:lumMod val="75000"/>
+                    <a:lumOff val="25000"/>
+                  </a:schemeClr>
+                </a:solidFill>
+                <a:latin typeface="+mn-lt"/>
+                <a:ea typeface="+mn-ea"/>
+                <a:cs typeface="+mn-cs"/>
+              </a:defRPr>
+            </a:lvl8pPr>
+            <a:lvl9pPr marL="3886200" indent="-228600" algn="l" defTabSz="457200" rtl="0" eaLnBrk="1" latinLnBrk="0" hangingPunct="1">
+              <a:spcBef>
+                <a:spcPts val="1000"/>
+              </a:spcBef>
+              <a:spcAft>
+                <a:spcPts val="0"/>
+              </a:spcAft>
+              <a:buClr>
+                <a:schemeClr val="accent1"/>
+              </a:buClr>
+              <a:buSzPct val="80000"/>
+              <a:buFont typeface="Wingdings 3" charset="2"/>
+              <a:buChar char=""/>
+              <a:defRPr sz="1200" kern="1200">
+                <a:solidFill>
+                  <a:schemeClr val="tx1">
+                    <a:lumMod val="75000"/>
+                    <a:lumOff val="25000"/>
+                  </a:schemeClr>
+                </a:solidFill>
+                <a:latin typeface="+mn-lt"/>
+                <a:ea typeface="+mn-ea"/>
+                <a:cs typeface="+mn-cs"/>
+              </a:defRPr>
+            </a:lvl9pPr>
+          </a:lstStyle>
+          <a:p>
+            <a:r>
+              <a:rPr lang="ru-RU" dirty="0" smtClean="0"/>
+              <a:t>Инструкция </a:t>
+            </a:r>
+            <a:r>
+              <a:rPr lang="en-US" dirty="0" smtClean="0"/>
+              <a:t>placement-new</a:t>
+            </a:r>
+            <a:r>
+              <a:rPr lang="ru-RU" dirty="0" smtClean="0"/>
+              <a:t>: </a:t>
+            </a:r>
+            <a:endParaRPr lang="en-US" dirty="0"/>
+          </a:p>
+        </p:txBody>
+      </p:sp>
+      <p:pic>
+        <p:nvPicPr>
+          <p:cNvPr id="14" name="Рисунок 13"/>
+          <p:cNvPicPr>
+            <a:picLocks noChangeAspect="1"/>
+          </p:cNvPicPr>
+          <p:nvPr/>
+        </p:nvPicPr>
+        <p:blipFill>
+          <a:blip r:embed="rId3"/>
+          <a:stretch>
+            <a:fillRect/>
+          </a:stretch>
+        </p:blipFill>
+        <p:spPr>
+          <a:xfrm>
+            <a:off x="4321509" y="2575300"/>
+            <a:ext cx="3470018" cy="473722"/>
+          </a:xfrm>
+          <a:prstGeom prst="rect">
+            <a:avLst/>
+          </a:prstGeom>
+        </p:spPr>
+      </p:pic>
+      <p:sp>
+        <p:nvSpPr>
+          <p:cNvPr id="15" name="Прямоугольник 14"/>
+          <p:cNvSpPr/>
+          <p:nvPr/>
+        </p:nvSpPr>
+        <p:spPr>
+          <a:xfrm>
+            <a:off x="404897" y="3278555"/>
+            <a:ext cx="11517744" cy="646331"/>
+          </a:xfrm>
+          <a:prstGeom prst="rect">
+            <a:avLst/>
+          </a:prstGeom>
+          <a:solidFill>
+            <a:schemeClr val="bg1"/>
+          </a:solidFill>
+        </p:spPr>
+        <p:txBody>
+          <a:bodyPr wrap="square">
+            <a:spAutoFit/>
+          </a:bodyPr>
+          <a:lstStyle/>
+          <a:p>
+            <a:r>
+              <a:rPr lang="ru-RU" dirty="0"/>
+              <a:t>Необходимая область </a:t>
+            </a:r>
+            <a:r>
+              <a:rPr lang="ru-RU" dirty="0" smtClean="0"/>
+              <a:t>памяти уже выделена </a:t>
+            </a:r>
+            <a:r>
+              <a:rPr lang="ru-RU" dirty="0"/>
+              <a:t>ранее, </a:t>
+            </a:r>
+            <a:r>
+              <a:rPr lang="ru-RU" dirty="0" smtClean="0"/>
+              <a:t>и на </a:t>
+            </a:r>
+            <a:r>
+              <a:rPr lang="ru-RU" dirty="0"/>
+              <a:t>неё </a:t>
+            </a:r>
+            <a:r>
+              <a:rPr lang="ru-RU" dirty="0" smtClean="0"/>
+              <a:t>указывает </a:t>
+            </a:r>
+            <a:r>
+              <a:rPr lang="en-US" dirty="0" smtClean="0"/>
+              <a:t>address, </a:t>
+            </a:r>
+            <a:r>
+              <a:rPr lang="ru-RU" dirty="0" smtClean="0"/>
+              <a:t>поэтому</a:t>
+            </a:r>
+            <a:r>
+              <a:rPr lang="en-US" dirty="0" smtClean="0"/>
+              <a:t> operator new </a:t>
+            </a:r>
+            <a:r>
+              <a:rPr lang="ru-RU" dirty="0" smtClean="0"/>
+              <a:t>ничего не делает:</a:t>
+            </a:r>
+            <a:endParaRPr lang="en-US" dirty="0"/>
+          </a:p>
+        </p:txBody>
+      </p:sp>
+      <p:sp>
+        <p:nvSpPr>
+          <p:cNvPr id="17" name="Прямоугольник 16"/>
+          <p:cNvSpPr/>
+          <p:nvPr/>
+        </p:nvSpPr>
+        <p:spPr>
+          <a:xfrm>
+            <a:off x="447174" y="5093100"/>
+            <a:ext cx="11475467" cy="369332"/>
+          </a:xfrm>
+          <a:prstGeom prst="rect">
+            <a:avLst/>
+          </a:prstGeom>
+          <a:solidFill>
+            <a:schemeClr val="bg1"/>
+          </a:solidFill>
+        </p:spPr>
+        <p:txBody>
+          <a:bodyPr wrap="square">
+            <a:spAutoFit/>
+          </a:bodyPr>
+          <a:lstStyle/>
+          <a:p>
+            <a:r>
+              <a:rPr lang="ru-RU" dirty="0" smtClean="0"/>
+              <a:t>В этой области памяти создаётся объект </a:t>
+            </a:r>
+            <a:endParaRPr lang="en-US" dirty="0"/>
+          </a:p>
+        </p:txBody>
+      </p:sp>
+      <p:pic>
+        <p:nvPicPr>
+          <p:cNvPr id="18" name="Рисунок 17"/>
+          <p:cNvPicPr>
+            <a:picLocks noChangeAspect="1"/>
+          </p:cNvPicPr>
+          <p:nvPr/>
+        </p:nvPicPr>
+        <p:blipFill>
+          <a:blip r:embed="rId4"/>
+          <a:stretch>
+            <a:fillRect/>
+          </a:stretch>
+        </p:blipFill>
+        <p:spPr>
+          <a:xfrm>
+            <a:off x="2987040" y="3950547"/>
+            <a:ext cx="6949439" cy="1124472"/>
+          </a:xfrm>
+          <a:prstGeom prst="rect">
+            <a:avLst/>
+          </a:prstGeom>
+        </p:spPr>
+      </p:pic>
+      <p:pic>
+        <p:nvPicPr>
+          <p:cNvPr id="20" name="Рисунок 19"/>
+          <p:cNvPicPr>
+            <a:picLocks noChangeAspect="1"/>
+          </p:cNvPicPr>
+          <p:nvPr/>
+        </p:nvPicPr>
+        <p:blipFill>
+          <a:blip r:embed="rId5"/>
+          <a:stretch>
+            <a:fillRect/>
+          </a:stretch>
+        </p:blipFill>
+        <p:spPr>
+          <a:xfrm>
+            <a:off x="732569" y="6141951"/>
+            <a:ext cx="6815346" cy="478806"/>
+          </a:xfrm>
+          <a:prstGeom prst="rect">
+            <a:avLst/>
+          </a:prstGeom>
+        </p:spPr>
+      </p:pic>
+      <p:sp>
+        <p:nvSpPr>
+          <p:cNvPr id="21" name="Объект 2"/>
+          <p:cNvSpPr txBox="1">
+            <a:spLocks/>
+          </p:cNvSpPr>
+          <p:nvPr/>
+        </p:nvSpPr>
+        <p:spPr>
+          <a:xfrm>
+            <a:off x="492931" y="5632506"/>
+            <a:ext cx="11387433" cy="509445"/>
+          </a:xfrm>
+          <a:prstGeom prst="rect">
+            <a:avLst/>
+          </a:prstGeom>
+          <a:solidFill>
+            <a:schemeClr val="bg1"/>
+          </a:solidFill>
+        </p:spPr>
+        <p:txBody>
+          <a:bodyPr vert="horz" lIns="91440" tIns="45720" rIns="91440" bIns="45720" rtlCol="0">
+            <a:normAutofit/>
+          </a:bodyPr>
+          <a:lstStyle>
+            <a:lvl1pPr marL="342900" indent="-342900" algn="l" defTabSz="457200" rtl="0" eaLnBrk="1" latinLnBrk="0" hangingPunct="1">
+              <a:spcBef>
+                <a:spcPts val="1000"/>
+              </a:spcBef>
+              <a:spcAft>
+                <a:spcPts val="0"/>
+              </a:spcAft>
+              <a:buClr>
+                <a:schemeClr val="accent1"/>
+              </a:buClr>
+              <a:buSzPct val="80000"/>
+              <a:buFont typeface="Wingdings 3" charset="2"/>
+              <a:buChar char=""/>
+              <a:defRPr sz="1800" kern="1200">
+                <a:solidFill>
+                  <a:schemeClr val="tx1">
+                    <a:lumMod val="75000"/>
+                    <a:lumOff val="25000"/>
+                  </a:schemeClr>
+                </a:solidFill>
+                <a:latin typeface="+mn-lt"/>
+                <a:ea typeface="+mn-ea"/>
+                <a:cs typeface="+mn-cs"/>
+              </a:defRPr>
+            </a:lvl1pPr>
+            <a:lvl2pPr marL="742950" indent="-285750" algn="l" defTabSz="457200" rtl="0" eaLnBrk="1" latinLnBrk="0" hangingPunct="1">
+              <a:spcBef>
+                <a:spcPts val="1000"/>
+              </a:spcBef>
+              <a:spcAft>
+                <a:spcPts val="0"/>
+              </a:spcAft>
+              <a:buClr>
+                <a:schemeClr val="accent1"/>
+              </a:buClr>
+              <a:buSzPct val="80000"/>
+              <a:buFont typeface="Wingdings 3" charset="2"/>
+              <a:buChar char=""/>
+              <a:defRPr sz="1600" kern="1200">
+                <a:solidFill>
+                  <a:schemeClr val="tx1">
+                    <a:lumMod val="75000"/>
+                    <a:lumOff val="25000"/>
+                  </a:schemeClr>
+                </a:solidFill>
+                <a:latin typeface="+mn-lt"/>
+                <a:ea typeface="+mn-ea"/>
+                <a:cs typeface="+mn-cs"/>
+              </a:defRPr>
+            </a:lvl2pPr>
+            <a:lvl3pPr marL="1143000" indent="-228600" algn="l" defTabSz="457200" rtl="0" eaLnBrk="1" latinLnBrk="0" hangingPunct="1">
+              <a:spcBef>
+                <a:spcPts val="1000"/>
+              </a:spcBef>
+              <a:spcAft>
+                <a:spcPts val="0"/>
+              </a:spcAft>
+              <a:buClr>
+                <a:schemeClr val="accent1"/>
+              </a:buClr>
+              <a:buSzPct val="80000"/>
+              <a:buFont typeface="Wingdings 3" charset="2"/>
+              <a:buChar char=""/>
+              <a:defRPr sz="1400" kern="1200">
+                <a:solidFill>
+                  <a:schemeClr val="tx1">
+                    <a:lumMod val="75000"/>
+                    <a:lumOff val="25000"/>
+                  </a:schemeClr>
+                </a:solidFill>
+                <a:latin typeface="+mn-lt"/>
+                <a:ea typeface="+mn-ea"/>
+                <a:cs typeface="+mn-cs"/>
+              </a:defRPr>
+            </a:lvl3pPr>
+            <a:lvl4pPr marL="1600200" indent="-228600" algn="l" defTabSz="457200" rtl="0" eaLnBrk="1" latinLnBrk="0" hangingPunct="1">
+              <a:spcBef>
+                <a:spcPts val="1000"/>
+              </a:spcBef>
+              <a:spcAft>
+                <a:spcPts val="0"/>
+              </a:spcAft>
+              <a:buClr>
+                <a:schemeClr val="accent1"/>
+              </a:buClr>
+              <a:buSzPct val="80000"/>
+              <a:buFont typeface="Wingdings 3" charset="2"/>
+              <a:buChar char=""/>
+              <a:defRPr sz="1200" kern="1200">
+                <a:solidFill>
+                  <a:schemeClr val="tx1">
+                    <a:lumMod val="75000"/>
+                    <a:lumOff val="25000"/>
+                  </a:schemeClr>
+                </a:solidFill>
+                <a:latin typeface="+mn-lt"/>
+                <a:ea typeface="+mn-ea"/>
+                <a:cs typeface="+mn-cs"/>
+              </a:defRPr>
+            </a:lvl4pPr>
+            <a:lvl5pPr marL="2057400" indent="-228600" algn="l" defTabSz="457200" rtl="0" eaLnBrk="1" latinLnBrk="0" hangingPunct="1">
+              <a:spcBef>
+                <a:spcPts val="1000"/>
+              </a:spcBef>
+              <a:spcAft>
+                <a:spcPts val="0"/>
+              </a:spcAft>
+              <a:buClr>
+                <a:schemeClr val="accent1"/>
+              </a:buClr>
+              <a:buSzPct val="80000"/>
+              <a:buFont typeface="Wingdings 3" charset="2"/>
+              <a:buChar char=""/>
+              <a:defRPr sz="1200" kern="1200">
+                <a:solidFill>
+                  <a:schemeClr val="tx1">
+                    <a:lumMod val="75000"/>
+                    <a:lumOff val="25000"/>
+                  </a:schemeClr>
+                </a:solidFill>
+                <a:latin typeface="+mn-lt"/>
+                <a:ea typeface="+mn-ea"/>
+                <a:cs typeface="+mn-cs"/>
+              </a:defRPr>
+            </a:lvl5pPr>
+            <a:lvl6pPr marL="2514600" indent="-228600" algn="l" defTabSz="457200" rtl="0" eaLnBrk="1" latinLnBrk="0" hangingPunct="1">
+              <a:spcBef>
+                <a:spcPts val="1000"/>
+              </a:spcBef>
+              <a:spcAft>
+                <a:spcPts val="0"/>
+              </a:spcAft>
+              <a:buClr>
+                <a:schemeClr val="accent1"/>
+              </a:buClr>
+              <a:buSzPct val="80000"/>
+              <a:buFont typeface="Wingdings 3" charset="2"/>
+              <a:buChar char=""/>
+              <a:defRPr sz="1200" kern="1200">
+                <a:solidFill>
+                  <a:schemeClr val="tx1">
+                    <a:lumMod val="75000"/>
+                    <a:lumOff val="25000"/>
+                  </a:schemeClr>
+                </a:solidFill>
+                <a:latin typeface="+mn-lt"/>
+                <a:ea typeface="+mn-ea"/>
+                <a:cs typeface="+mn-cs"/>
+              </a:defRPr>
+            </a:lvl6pPr>
+            <a:lvl7pPr marL="2971800" indent="-228600" algn="l" defTabSz="457200" rtl="0" eaLnBrk="1" latinLnBrk="0" hangingPunct="1">
+              <a:spcBef>
+                <a:spcPts val="1000"/>
+              </a:spcBef>
+              <a:spcAft>
+                <a:spcPts val="0"/>
+              </a:spcAft>
+              <a:buClr>
+                <a:schemeClr val="accent1"/>
+              </a:buClr>
+              <a:buSzPct val="80000"/>
+              <a:buFont typeface="Wingdings 3" charset="2"/>
+              <a:buChar char=""/>
+              <a:defRPr sz="1200" kern="1200">
+                <a:solidFill>
+                  <a:schemeClr val="tx1">
+                    <a:lumMod val="75000"/>
+                    <a:lumOff val="25000"/>
+                  </a:schemeClr>
+                </a:solidFill>
+                <a:latin typeface="+mn-lt"/>
+                <a:ea typeface="+mn-ea"/>
+                <a:cs typeface="+mn-cs"/>
+              </a:defRPr>
+            </a:lvl7pPr>
+            <a:lvl8pPr marL="3429000" indent="-228600" algn="l" defTabSz="457200" rtl="0" eaLnBrk="1" latinLnBrk="0" hangingPunct="1">
+              <a:spcBef>
+                <a:spcPts val="1000"/>
+              </a:spcBef>
+              <a:spcAft>
+                <a:spcPts val="0"/>
+              </a:spcAft>
+              <a:buClr>
+                <a:schemeClr val="accent1"/>
+              </a:buClr>
+              <a:buSzPct val="80000"/>
+              <a:buFont typeface="Wingdings 3" charset="2"/>
+              <a:buChar char=""/>
+              <a:defRPr sz="1200" kern="1200">
+                <a:solidFill>
+                  <a:schemeClr val="tx1">
+                    <a:lumMod val="75000"/>
+                    <a:lumOff val="25000"/>
+                  </a:schemeClr>
+                </a:solidFill>
+                <a:latin typeface="+mn-lt"/>
+                <a:ea typeface="+mn-ea"/>
+                <a:cs typeface="+mn-cs"/>
+              </a:defRPr>
+            </a:lvl8pPr>
+            <a:lvl9pPr marL="3886200" indent="-228600" algn="l" defTabSz="457200" rtl="0" eaLnBrk="1" latinLnBrk="0" hangingPunct="1">
+              <a:spcBef>
+                <a:spcPts val="1000"/>
+              </a:spcBef>
+              <a:spcAft>
+                <a:spcPts val="0"/>
+              </a:spcAft>
+              <a:buClr>
+                <a:schemeClr val="accent1"/>
+              </a:buClr>
+              <a:buSzPct val="80000"/>
+              <a:buFont typeface="Wingdings 3" charset="2"/>
+              <a:buChar char=""/>
+              <a:defRPr sz="1200" kern="1200">
+                <a:solidFill>
+                  <a:schemeClr val="tx1">
+                    <a:lumMod val="75000"/>
+                    <a:lumOff val="25000"/>
+                  </a:schemeClr>
+                </a:solidFill>
+                <a:latin typeface="+mn-lt"/>
+                <a:ea typeface="+mn-ea"/>
+                <a:cs typeface="+mn-cs"/>
+              </a:defRPr>
+            </a:lvl9pPr>
+          </a:lstStyle>
+          <a:p>
+            <a:r>
+              <a:rPr lang="ru-RU" dirty="0" smtClean="0"/>
+              <a:t>Инструкция </a:t>
+            </a:r>
+            <a:r>
+              <a:rPr lang="en-US" dirty="0" smtClean="0"/>
+              <a:t>placement-new</a:t>
+            </a:r>
+            <a:r>
+              <a:rPr lang="ru-RU" dirty="0"/>
+              <a:t> </a:t>
+            </a:r>
+            <a:r>
+              <a:rPr lang="ru-RU" dirty="0" smtClean="0"/>
+              <a:t>позволяет реализовать строку псевдокода:</a:t>
+            </a:r>
+            <a:endParaRPr lang="en-US" dirty="0"/>
+          </a:p>
+        </p:txBody>
+      </p:sp>
+    </p:spTree>
+    <p:extLst>
+      <p:ext uri="{BB962C8B-B14F-4D97-AF65-F5344CB8AC3E}">
+        <p14:creationId xmlns:p14="http://schemas.microsoft.com/office/powerpoint/2010/main" val="112445219"/>
+      </p:ext>
+    </p:extLst>
+  </p:cSld>
+  <p:clrMapOvr>
+    <a:masterClrMapping/>
+  </p:clrMapOvr>
+</p:sld>
+</file>
+
+<file path=ppt/slides/slide14.xml><?xml version="1.0" encoding="utf-8"?>
+<p:sld xmlns:a="http://schemas.openxmlformats.org/drawingml/2006/main" xmlns:r="http://schemas.openxmlformats.org/officeDocument/2006/relationships" xmlns:p="http://schemas.openxmlformats.org/presentationml/2006/main">
+  <p:cSld>
+    <p:spTree>
+      <p:nvGrpSpPr>
+        <p:cNvPr id="1" name=""/>
+        <p:cNvGrpSpPr/>
+        <p:nvPr/>
+      </p:nvGrpSpPr>
+      <p:grpSpPr>
+        <a:xfrm>
+          <a:off x="0" y="0"/>
+          <a:ext cx="0" cy="0"/>
+          <a:chOff x="0" y="0"/>
+          <a:chExt cx="0" cy="0"/>
+        </a:xfrm>
+      </p:grpSpPr>
+      <p:sp>
+        <p:nvSpPr>
+          <p:cNvPr id="3" name="Объект 2"/>
+          <p:cNvSpPr>
+            <a:spLocks noGrp="1"/>
+          </p:cNvSpPr>
+          <p:nvPr>
+            <p:ph idx="1"/>
+          </p:nvPr>
+        </p:nvSpPr>
+        <p:spPr/>
+        <p:txBody>
+          <a:bodyPr/>
+          <a:lstStyle/>
+          <a:p>
+            <a:endParaRPr lang="en-US"/>
+          </a:p>
+        </p:txBody>
+      </p:sp>
+      <p:sp>
+        <p:nvSpPr>
+          <p:cNvPr id="4" name="Title 1">
+            <a:extLst>
+              <a:ext uri="{FF2B5EF4-FFF2-40B4-BE49-F238E27FC236}">
+                <a16:creationId xmlns:a16="http://schemas.microsoft.com/office/drawing/2014/main" xmlns="" id="{ECF0BCE9-3024-43A2-BA59-C2729B585737}"/>
+              </a:ext>
+            </a:extLst>
+          </p:cNvPr>
+          <p:cNvSpPr>
+            <a:spLocks noGrp="1"/>
+          </p:cNvSpPr>
+          <p:nvPr>
+            <p:ph type="title"/>
+          </p:nvPr>
+        </p:nvSpPr>
+        <p:spPr>
+          <a:xfrm>
+            <a:off x="404897" y="175616"/>
+            <a:ext cx="11517744" cy="628335"/>
+          </a:xfrm>
+          <a:solidFill>
+            <a:schemeClr val="bg1"/>
+          </a:solidFill>
+          <a:ln>
+            <a:solidFill>
+              <a:schemeClr val="tx1"/>
+            </a:solidFill>
+          </a:ln>
+        </p:spPr>
+        <p:txBody>
+          <a:bodyPr>
+            <a:noAutofit/>
+          </a:bodyPr>
+          <a:lstStyle/>
+          <a:p>
+            <a:pPr algn="ctr"/>
+            <a:r>
+              <a:rPr lang="en-US" sz="2800" dirty="0" smtClean="0"/>
+              <a:t>placement-</a:t>
+            </a:r>
+            <a:r>
+              <a:rPr lang="en-US" sz="2800" dirty="0" smtClean="0"/>
+              <a:t>new</a:t>
+            </a:r>
+            <a:endParaRPr lang="en-US" sz="2800" dirty="0"/>
+          </a:p>
+        </p:txBody>
+      </p:sp>
+    </p:spTree>
+    <p:extLst>
+      <p:ext uri="{BB962C8B-B14F-4D97-AF65-F5344CB8AC3E}">
+        <p14:creationId xmlns:p14="http://schemas.microsoft.com/office/powerpoint/2010/main" val="1806235789"/>
+      </p:ext>
+    </p:extLst>
+  </p:cSld>
+  <p:clrMapOvr>
+    <a:masterClrMapping/>
+  </p:clrMapOvr>
+</p:sld>
+</file>
+
+<file path=ppt/slides/slide15.xml><?xml version="1.0" encoding="utf-8"?>
+<p:sld xmlns:a="http://schemas.openxmlformats.org/drawingml/2006/main" xmlns:r="http://schemas.openxmlformats.org/officeDocument/2006/relationships" xmlns:p="http://schemas.openxmlformats.org/presentationml/2006/main">
+  <p:cSld>
+    <p:spTree>
+      <p:nvGrpSpPr>
+        <p:cNvPr id="1" name=""/>
+        <p:cNvGrpSpPr/>
+        <p:nvPr/>
+      </p:nvGrpSpPr>
+      <p:grpSpPr>
+        <a:xfrm>
+          <a:off x="0" y="0"/>
+          <a:ext cx="0" cy="0"/>
+          <a:chOff x="0" y="0"/>
+          <a:chExt cx="0" cy="0"/>
+        </a:xfrm>
+      </p:grpSpPr>
+      <p:sp>
+        <p:nvSpPr>
+          <p:cNvPr id="3" name="Объект 2"/>
+          <p:cNvSpPr>
+            <a:spLocks noGrp="1"/>
+          </p:cNvSpPr>
+          <p:nvPr>
+            <p:ph idx="1"/>
+          </p:nvPr>
+        </p:nvSpPr>
+        <p:spPr>
+          <a:xfrm>
+            <a:off x="404897" y="1099695"/>
+            <a:ext cx="11517744" cy="1395411"/>
+          </a:xfrm>
+          <a:solidFill>
+            <a:schemeClr val="bg1"/>
+          </a:solidFill>
+        </p:spPr>
+        <p:txBody>
+          <a:bodyPr>
+            <a:normAutofit lnSpcReduction="10000"/>
+          </a:bodyPr>
+          <a:lstStyle/>
+          <a:p>
+            <a:r>
+              <a:rPr lang="ru-RU" sz="2000" dirty="0" smtClean="0"/>
+              <a:t>Инструкция </a:t>
+            </a:r>
+            <a:r>
+              <a:rPr lang="en-US" sz="2000" dirty="0" smtClean="0"/>
+              <a:t>delete </a:t>
+            </a:r>
+            <a:r>
+              <a:rPr lang="ru-RU" sz="2000" dirty="0" smtClean="0"/>
+              <a:t>и </a:t>
+            </a:r>
+            <a:r>
+              <a:rPr lang="en-US" sz="2000" dirty="0" smtClean="0"/>
+              <a:t>operator delete </a:t>
+            </a:r>
+            <a:r>
+              <a:rPr lang="ru-RU" sz="2000" dirty="0" smtClean="0"/>
+              <a:t>соотносятся между собой так же, как и инструкция </a:t>
+            </a:r>
+            <a:r>
+              <a:rPr lang="en-US" sz="2000" dirty="0" smtClean="0"/>
+              <a:t>new </a:t>
+            </a:r>
+            <a:r>
+              <a:rPr lang="ru-RU" sz="2000" dirty="0" smtClean="0"/>
+              <a:t>и </a:t>
+            </a:r>
+            <a:r>
+              <a:rPr lang="en-US" sz="2000" dirty="0" smtClean="0"/>
+              <a:t>operator new</a:t>
+            </a:r>
+          </a:p>
+          <a:p>
+            <a:r>
+              <a:rPr lang="ru-RU" sz="2000" dirty="0" smtClean="0"/>
+              <a:t>Выполнение инструкция </a:t>
+            </a:r>
+            <a:r>
+              <a:rPr lang="en-US" sz="2000" dirty="0" smtClean="0"/>
+              <a:t>delete</a:t>
+            </a:r>
+            <a:r>
+              <a:rPr lang="ru-RU" sz="2000" dirty="0" smtClean="0"/>
+              <a:t> в общем случае происходит приблизительно в следующем порядке:</a:t>
+            </a:r>
+            <a:endParaRPr lang="en-US" sz="2000" dirty="0"/>
+          </a:p>
+        </p:txBody>
+      </p:sp>
+      <p:sp>
+        <p:nvSpPr>
+          <p:cNvPr id="4" name="Title 1">
+            <a:extLst>
+              <a:ext uri="{FF2B5EF4-FFF2-40B4-BE49-F238E27FC236}">
+                <a16:creationId xmlns:a16="http://schemas.microsoft.com/office/drawing/2014/main" xmlns="" id="{ECF0BCE9-3024-43A2-BA59-C2729B585737}"/>
+              </a:ext>
+            </a:extLst>
+          </p:cNvPr>
+          <p:cNvSpPr>
+            <a:spLocks noGrp="1"/>
+          </p:cNvSpPr>
+          <p:nvPr>
+            <p:ph type="title"/>
+          </p:nvPr>
+        </p:nvSpPr>
+        <p:spPr>
+          <a:xfrm>
+            <a:off x="404897" y="175616"/>
+            <a:ext cx="11517744" cy="628335"/>
+          </a:xfrm>
+          <a:solidFill>
+            <a:schemeClr val="bg1"/>
+          </a:solidFill>
+          <a:ln>
+            <a:solidFill>
+              <a:schemeClr val="tx1"/>
+            </a:solidFill>
+          </a:ln>
+        </p:spPr>
+        <p:txBody>
+          <a:bodyPr>
+            <a:noAutofit/>
+          </a:bodyPr>
+          <a:lstStyle/>
+          <a:p>
+            <a:pPr algn="ctr"/>
+            <a:r>
+              <a:rPr lang="ru-RU" sz="2800" dirty="0" smtClean="0"/>
+              <a:t>Перегрузка глобального </a:t>
+            </a:r>
+            <a:r>
+              <a:rPr lang="en-US" sz="2800" dirty="0" smtClean="0"/>
+              <a:t>operator delete</a:t>
+            </a:r>
+            <a:endParaRPr lang="en-US" sz="2800" dirty="0"/>
+          </a:p>
+        </p:txBody>
+      </p:sp>
+      <p:pic>
+        <p:nvPicPr>
+          <p:cNvPr id="5" name="Рисунок 4"/>
+          <p:cNvPicPr>
+            <a:picLocks noChangeAspect="1"/>
+          </p:cNvPicPr>
+          <p:nvPr/>
+        </p:nvPicPr>
+        <p:blipFill>
+          <a:blip r:embed="rId2"/>
+          <a:stretch>
+            <a:fillRect/>
+          </a:stretch>
+        </p:blipFill>
+        <p:spPr>
+          <a:xfrm>
+            <a:off x="1512499" y="2819678"/>
+            <a:ext cx="2781097" cy="487680"/>
+          </a:xfrm>
+          <a:prstGeom prst="rect">
+            <a:avLst/>
+          </a:prstGeom>
+        </p:spPr>
+      </p:pic>
+      <p:pic>
+        <p:nvPicPr>
+          <p:cNvPr id="6" name="Рисунок 5"/>
+          <p:cNvPicPr>
+            <a:picLocks noChangeAspect="1"/>
+          </p:cNvPicPr>
+          <p:nvPr/>
+        </p:nvPicPr>
+        <p:blipFill>
+          <a:blip r:embed="rId3"/>
+          <a:stretch>
+            <a:fillRect/>
+          </a:stretch>
+        </p:blipFill>
+        <p:spPr>
+          <a:xfrm>
+            <a:off x="691032" y="4093169"/>
+            <a:ext cx="6023747" cy="554243"/>
+          </a:xfrm>
+          <a:prstGeom prst="rect">
+            <a:avLst/>
+          </a:prstGeom>
+        </p:spPr>
+      </p:pic>
+      <p:pic>
+        <p:nvPicPr>
+          <p:cNvPr id="7" name="Рисунок 6"/>
+          <p:cNvPicPr>
+            <a:picLocks noChangeAspect="1"/>
+          </p:cNvPicPr>
+          <p:nvPr/>
+        </p:nvPicPr>
+        <p:blipFill>
+          <a:blip r:embed="rId4"/>
+          <a:stretch>
+            <a:fillRect/>
+          </a:stretch>
+        </p:blipFill>
+        <p:spPr>
+          <a:xfrm>
+            <a:off x="691032" y="4954152"/>
+            <a:ext cx="4968767" cy="774543"/>
+          </a:xfrm>
+          <a:prstGeom prst="rect">
+            <a:avLst/>
+          </a:prstGeom>
+        </p:spPr>
+      </p:pic>
+      <p:sp>
+        <p:nvSpPr>
+          <p:cNvPr id="8" name="Стрелка вниз 7"/>
+          <p:cNvSpPr/>
+          <p:nvPr/>
+        </p:nvSpPr>
+        <p:spPr>
+          <a:xfrm>
+            <a:off x="2631440" y="3388638"/>
+            <a:ext cx="355600" cy="548640"/>
+          </a:xfrm>
+          <a:prstGeom prst="downArrow">
+            <a:avLst/>
+          </a:prstGeom>
+        </p:spPr>
+        <p:style>
+          <a:lnRef idx="2">
+            <a:schemeClr val="accent1">
+              <a:shade val="50000"/>
+            </a:schemeClr>
+          </a:lnRef>
+          <a:fillRef idx="1">
+            <a:schemeClr val="accent1"/>
+          </a:fillRef>
+          <a:effectRef idx="0">
+            <a:schemeClr val="accent1"/>
+          </a:effectRef>
+          <a:fontRef idx="minor">
+            <a:schemeClr val="lt1"/>
+          </a:fontRef>
+        </p:style>
+        <p:txBody>
+          <a:bodyPr rtlCol="0" anchor="ctr"/>
+          <a:lstStyle/>
+          <a:p>
+            <a:pPr algn="ctr"/>
+            <a:endParaRPr lang="en-US"/>
+          </a:p>
+        </p:txBody>
+      </p:sp>
+      <p:cxnSp>
+        <p:nvCxnSpPr>
+          <p:cNvPr id="12" name="Прямая соединительная линия 11"/>
+          <p:cNvCxnSpPr/>
+          <p:nvPr/>
+        </p:nvCxnSpPr>
+        <p:spPr>
+          <a:xfrm>
+            <a:off x="6714779" y="4093169"/>
+            <a:ext cx="895061" cy="0"/>
+          </a:xfrm>
+          <a:prstGeom prst="line">
+            <a:avLst/>
+          </a:prstGeom>
+        </p:spPr>
+        <p:style>
+          <a:lnRef idx="1">
+            <a:schemeClr val="accent1"/>
+          </a:lnRef>
+          <a:fillRef idx="0">
+            <a:schemeClr val="accent1"/>
+          </a:fillRef>
+          <a:effectRef idx="0">
+            <a:schemeClr val="accent1"/>
+          </a:effectRef>
+          <a:fontRef idx="minor">
+            <a:schemeClr val="tx1"/>
+          </a:fontRef>
+        </p:style>
+      </p:cxnSp>
+      <p:cxnSp>
+        <p:nvCxnSpPr>
+          <p:cNvPr id="14" name="Прямая соединительная линия 13"/>
+          <p:cNvCxnSpPr/>
+          <p:nvPr/>
+        </p:nvCxnSpPr>
+        <p:spPr>
+          <a:xfrm>
+            <a:off x="5659799" y="5039066"/>
+            <a:ext cx="2071961" cy="1"/>
+          </a:xfrm>
+          <a:prstGeom prst="line">
+            <a:avLst/>
+          </a:prstGeom>
+        </p:spPr>
+        <p:style>
+          <a:lnRef idx="1">
+            <a:schemeClr val="accent1"/>
+          </a:lnRef>
+          <a:fillRef idx="0">
+            <a:schemeClr val="accent1"/>
+          </a:fillRef>
+          <a:effectRef idx="0">
+            <a:schemeClr val="accent1"/>
+          </a:effectRef>
+          <a:fontRef idx="minor">
+            <a:schemeClr val="tx1"/>
+          </a:fontRef>
+        </p:style>
+      </p:cxnSp>
+      <p:sp>
+        <p:nvSpPr>
+          <p:cNvPr id="15" name="TextBox 14"/>
+          <p:cNvSpPr txBox="1"/>
+          <p:nvPr/>
+        </p:nvSpPr>
+        <p:spPr>
+          <a:xfrm>
+            <a:off x="7731760" y="3533280"/>
+            <a:ext cx="4170561" cy="646331"/>
+          </a:xfrm>
+          <a:prstGeom prst="rect">
+            <a:avLst/>
+          </a:prstGeom>
+        </p:spPr>
+        <p:style>
+          <a:lnRef idx="2">
+            <a:schemeClr val="accent1"/>
+          </a:lnRef>
+          <a:fillRef idx="1">
+            <a:schemeClr val="lt1"/>
+          </a:fillRef>
+          <a:effectRef idx="0">
+            <a:schemeClr val="accent1"/>
+          </a:effectRef>
+          <a:fontRef idx="minor">
+            <a:schemeClr val="dk1"/>
+          </a:fontRef>
+        </p:style>
+        <p:txBody>
+          <a:bodyPr wrap="square" rtlCol="0">
+            <a:spAutoFit/>
+          </a:bodyPr>
+          <a:lstStyle/>
+          <a:p>
+            <a:r>
+              <a:rPr lang="ru-RU" dirty="0" smtClean="0"/>
+              <a:t>Вызов деструктора объекта, на который указывает  </a:t>
+            </a:r>
+            <a:r>
+              <a:rPr lang="en-US" dirty="0" err="1" smtClean="0"/>
+              <a:t>stringPtr</a:t>
+            </a:r>
+            <a:endParaRPr lang="en-US" dirty="0"/>
+          </a:p>
+        </p:txBody>
+      </p:sp>
+      <p:sp>
+        <p:nvSpPr>
+          <p:cNvPr id="16" name="TextBox 15"/>
+          <p:cNvSpPr txBox="1"/>
+          <p:nvPr/>
+        </p:nvSpPr>
+        <p:spPr>
+          <a:xfrm>
+            <a:off x="7752080" y="4954152"/>
+            <a:ext cx="4170561" cy="646331"/>
+          </a:xfrm>
+          <a:prstGeom prst="rect">
+            <a:avLst/>
+          </a:prstGeom>
+        </p:spPr>
+        <p:style>
+          <a:lnRef idx="2">
+            <a:schemeClr val="accent1"/>
+          </a:lnRef>
+          <a:fillRef idx="1">
+            <a:schemeClr val="lt1"/>
+          </a:fillRef>
+          <a:effectRef idx="0">
+            <a:schemeClr val="accent1"/>
+          </a:effectRef>
+          <a:fontRef idx="minor">
+            <a:schemeClr val="dk1"/>
+          </a:fontRef>
+        </p:style>
+        <p:txBody>
+          <a:bodyPr wrap="square" rtlCol="0">
+            <a:spAutoFit/>
+          </a:bodyPr>
+          <a:lstStyle/>
+          <a:p>
+            <a:r>
+              <a:rPr lang="ru-RU" dirty="0" smtClean="0"/>
+              <a:t>Освобождение области памяти, на которую указывает </a:t>
+            </a:r>
+            <a:r>
+              <a:rPr lang="en-US" dirty="0" err="1" smtClean="0"/>
+              <a:t>stringPtr</a:t>
+            </a:r>
+            <a:endParaRPr lang="en-US" dirty="0"/>
+          </a:p>
+        </p:txBody>
+      </p:sp>
+    </p:spTree>
+    <p:extLst>
+      <p:ext uri="{BB962C8B-B14F-4D97-AF65-F5344CB8AC3E}">
+        <p14:creationId xmlns:p14="http://schemas.microsoft.com/office/powerpoint/2010/main" val="1194108779"/>
+      </p:ext>
+    </p:extLst>
+  </p:cSld>
+  <p:clrMapOvr>
+    <a:masterClrMapping/>
+  </p:clrMapOvr>
+</p:sld>
+</file>
+
+<file path=ppt/slides/slide16.xml><?xml version="1.0" encoding="utf-8"?>
+<p:sld xmlns:a="http://schemas.openxmlformats.org/drawingml/2006/main" xmlns:r="http://schemas.openxmlformats.org/officeDocument/2006/relationships" xmlns:p="http://schemas.openxmlformats.org/presentationml/2006/main">
+  <p:cSld>
+    <p:spTree>
+      <p:nvGrpSpPr>
+        <p:cNvPr id="1" name=""/>
+        <p:cNvGrpSpPr/>
+        <p:nvPr/>
+      </p:nvGrpSpPr>
+      <p:grpSpPr>
+        <a:xfrm>
+          <a:off x="0" y="0"/>
+          <a:ext cx="0" cy="0"/>
+          <a:chOff x="0" y="0"/>
+          <a:chExt cx="0" cy="0"/>
+        </a:xfrm>
+      </p:grpSpPr>
+      <p:sp>
+        <p:nvSpPr>
+          <p:cNvPr id="3" name="Объект 2"/>
+          <p:cNvSpPr>
+            <a:spLocks noGrp="1"/>
+          </p:cNvSpPr>
+          <p:nvPr>
+            <p:ph idx="1"/>
+          </p:nvPr>
+        </p:nvSpPr>
+        <p:spPr>
+          <a:xfrm>
+            <a:off x="235130" y="3733242"/>
+            <a:ext cx="11570790" cy="3012998"/>
+          </a:xfrm>
+          <a:solidFill>
+            <a:schemeClr val="bg1"/>
+          </a:solidFill>
+        </p:spPr>
+        <p:txBody>
+          <a:bodyPr>
+            <a:normAutofit/>
+          </a:bodyPr>
+          <a:lstStyle/>
+          <a:p>
+            <a:r>
+              <a:rPr lang="ru-RU" sz="2000" dirty="0" smtClean="0"/>
+              <a:t>Все стандартные операторы </a:t>
+            </a:r>
+            <a:r>
+              <a:rPr lang="en-US" sz="2000" dirty="0" smtClean="0"/>
+              <a:t>delete </a:t>
+            </a:r>
+            <a:r>
+              <a:rPr lang="ru-RU" sz="2000" dirty="0" smtClean="0"/>
+              <a:t>не генерируют исключений. Указатель </a:t>
+            </a:r>
+            <a:r>
+              <a:rPr lang="en-US" sz="2000" dirty="0" err="1" smtClean="0"/>
+              <a:t>ptr</a:t>
+            </a:r>
+            <a:r>
+              <a:rPr lang="en-US" sz="2000" dirty="0" smtClean="0"/>
+              <a:t>*, </a:t>
+            </a:r>
+            <a:r>
+              <a:rPr lang="ru-RU" sz="2000" dirty="0" smtClean="0"/>
+              <a:t>указывающий на область памяти, которую требует освободить, может быть указателем, полученным ранее в результате выполнения инструкции </a:t>
+            </a:r>
+            <a:r>
+              <a:rPr lang="en-US" sz="2000" dirty="0" smtClean="0"/>
+              <a:t>new </a:t>
+            </a:r>
+            <a:r>
+              <a:rPr lang="ru-RU" sz="2000" dirty="0" smtClean="0"/>
+              <a:t>либо нулевым указателем </a:t>
+            </a:r>
+            <a:r>
+              <a:rPr lang="en-US" sz="2000" dirty="0" err="1" smtClean="0"/>
+              <a:t>nullptr</a:t>
+            </a:r>
+            <a:r>
+              <a:rPr lang="en-US" sz="2000" dirty="0" smtClean="0"/>
+              <a:t>. </a:t>
+            </a:r>
+            <a:r>
+              <a:rPr lang="ru-RU" sz="2000" dirty="0" smtClean="0"/>
+              <a:t>В противном случае, поведение не определено</a:t>
+            </a:r>
+          </a:p>
+          <a:p>
+            <a:r>
+              <a:rPr lang="ru-RU" sz="2000" dirty="0" smtClean="0"/>
+              <a:t>Оператор (3) вызывается перегрузкой оператора </a:t>
+            </a:r>
+            <a:r>
+              <a:rPr lang="en-US" sz="2000" dirty="0" smtClean="0"/>
+              <a:t>new</a:t>
+            </a:r>
+            <a:r>
+              <a:rPr lang="ru-RU" sz="2000" dirty="0" smtClean="0"/>
+              <a:t>, не генерирующей исключений,</a:t>
+            </a:r>
+            <a:r>
+              <a:rPr lang="en-US" sz="2000" dirty="0" smtClean="0"/>
+              <a:t> </a:t>
+            </a:r>
+            <a:r>
+              <a:rPr lang="ru-RU" sz="2000" dirty="0" smtClean="0"/>
+              <a:t>в случае, когда не удалось выделить память</a:t>
+            </a:r>
+          </a:p>
+          <a:p>
+            <a:r>
+              <a:rPr lang="ru-RU" sz="2000" dirty="0" smtClean="0"/>
+              <a:t>Аналогично, оператор (4) вызывается </a:t>
+            </a:r>
+            <a:r>
+              <a:rPr lang="en-US" sz="2000" dirty="0" smtClean="0"/>
+              <a:t>place-new-</a:t>
+            </a:r>
+            <a:r>
+              <a:rPr lang="ru-RU" sz="2000" dirty="0" smtClean="0"/>
+              <a:t>версией оператора </a:t>
+            </a:r>
+            <a:r>
+              <a:rPr lang="en-US" sz="2000" dirty="0" smtClean="0"/>
+              <a:t>new. </a:t>
+            </a:r>
+            <a:r>
+              <a:rPr lang="ru-RU" sz="2000" dirty="0" smtClean="0"/>
+              <a:t>Тоже ничего не делает, так как в этом случае за управление памятью отвечает кто-то другой</a:t>
+            </a:r>
+            <a:endParaRPr lang="en-US" sz="2000" dirty="0"/>
+          </a:p>
+        </p:txBody>
+      </p:sp>
+      <p:pic>
+        <p:nvPicPr>
+          <p:cNvPr id="6" name="Рисунок 5"/>
+          <p:cNvPicPr>
+            <a:picLocks noChangeAspect="1"/>
+          </p:cNvPicPr>
+          <p:nvPr/>
+        </p:nvPicPr>
+        <p:blipFill rotWithShape="1">
+          <a:blip r:embed="rId3"/>
+          <a:srcRect t="19277" b="9225"/>
+          <a:stretch/>
+        </p:blipFill>
+        <p:spPr>
+          <a:xfrm>
+            <a:off x="545634" y="1066800"/>
+            <a:ext cx="7048314" cy="314960"/>
+          </a:xfrm>
+          <a:prstGeom prst="rect">
+            <a:avLst/>
+          </a:prstGeom>
+        </p:spPr>
+      </p:pic>
+      <p:sp>
+        <p:nvSpPr>
+          <p:cNvPr id="7" name="Title 1">
+            <a:extLst>
+              <a:ext uri="{FF2B5EF4-FFF2-40B4-BE49-F238E27FC236}">
+                <a16:creationId xmlns:a16="http://schemas.microsoft.com/office/drawing/2014/main" xmlns="" id="{ECF0BCE9-3024-43A2-BA59-C2729B585737}"/>
+              </a:ext>
+            </a:extLst>
+          </p:cNvPr>
+          <p:cNvSpPr>
+            <a:spLocks noGrp="1"/>
+          </p:cNvSpPr>
+          <p:nvPr>
+            <p:ph type="title"/>
+          </p:nvPr>
+        </p:nvSpPr>
+        <p:spPr>
+          <a:xfrm>
+            <a:off x="404897" y="175616"/>
+            <a:ext cx="11517744" cy="628335"/>
+          </a:xfrm>
+          <a:solidFill>
+            <a:schemeClr val="bg1"/>
+          </a:solidFill>
+          <a:ln>
+            <a:solidFill>
+              <a:schemeClr val="tx1"/>
+            </a:solidFill>
+          </a:ln>
+        </p:spPr>
+        <p:txBody>
+          <a:bodyPr>
+            <a:noAutofit/>
+          </a:bodyPr>
+          <a:lstStyle/>
+          <a:p>
+            <a:pPr algn="ctr"/>
+            <a:r>
+              <a:rPr lang="ru-RU" sz="2800" dirty="0" smtClean="0"/>
+              <a:t>Перегрузка глобального </a:t>
+            </a:r>
+            <a:r>
+              <a:rPr lang="en-US" sz="2800" dirty="0" smtClean="0"/>
+              <a:t>operator delete</a:t>
+            </a:r>
+            <a:endParaRPr lang="en-US" sz="2800" dirty="0"/>
+          </a:p>
+        </p:txBody>
+      </p:sp>
+      <p:pic>
+        <p:nvPicPr>
+          <p:cNvPr id="9" name="Рисунок 8"/>
+          <p:cNvPicPr>
+            <a:picLocks noChangeAspect="1"/>
+          </p:cNvPicPr>
+          <p:nvPr/>
+        </p:nvPicPr>
+        <p:blipFill rotWithShape="1">
+          <a:blip r:embed="rId4"/>
+          <a:srcRect l="1184" t="5181"/>
+          <a:stretch/>
+        </p:blipFill>
+        <p:spPr>
+          <a:xfrm>
+            <a:off x="496337" y="1534160"/>
+            <a:ext cx="10515329" cy="396240"/>
+          </a:xfrm>
+          <a:prstGeom prst="rect">
+            <a:avLst/>
+          </a:prstGeom>
+        </p:spPr>
+      </p:pic>
+      <p:pic>
+        <p:nvPicPr>
+          <p:cNvPr id="10" name="Рисунок 9"/>
+          <p:cNvPicPr>
+            <a:picLocks noChangeAspect="1"/>
+          </p:cNvPicPr>
+          <p:nvPr/>
+        </p:nvPicPr>
+        <p:blipFill rotWithShape="1">
+          <a:blip r:embed="rId5"/>
+          <a:srcRect l="945" t="10531" b="7895"/>
+          <a:stretch/>
+        </p:blipFill>
+        <p:spPr>
+          <a:xfrm>
+            <a:off x="496337" y="2150157"/>
+            <a:ext cx="11581727" cy="343077"/>
+          </a:xfrm>
+          <a:prstGeom prst="rect">
+            <a:avLst/>
+          </a:prstGeom>
+        </p:spPr>
+      </p:pic>
+      <p:pic>
+        <p:nvPicPr>
+          <p:cNvPr id="11" name="Рисунок 10"/>
+          <p:cNvPicPr>
+            <a:picLocks noChangeAspect="1"/>
+          </p:cNvPicPr>
+          <p:nvPr/>
+        </p:nvPicPr>
+        <p:blipFill rotWithShape="1">
+          <a:blip r:embed="rId6"/>
+          <a:srcRect l="819" t="16951" b="-1"/>
+          <a:stretch/>
+        </p:blipFill>
+        <p:spPr>
+          <a:xfrm>
+            <a:off x="496337" y="2745087"/>
+            <a:ext cx="9417634" cy="339043"/>
+          </a:xfrm>
+          <a:prstGeom prst="rect">
+            <a:avLst/>
+          </a:prstGeom>
+        </p:spPr>
+      </p:pic>
+      <p:sp>
+        <p:nvSpPr>
+          <p:cNvPr id="12" name="TextBox 11"/>
+          <p:cNvSpPr txBox="1"/>
+          <p:nvPr/>
+        </p:nvSpPr>
+        <p:spPr>
+          <a:xfrm>
+            <a:off x="211706" y="1009251"/>
+            <a:ext cx="306494" cy="369332"/>
+          </a:xfrm>
+          <a:prstGeom prst="rect">
+            <a:avLst/>
+          </a:prstGeom>
+          <a:noFill/>
+        </p:spPr>
+        <p:txBody>
+          <a:bodyPr wrap="none" rtlCol="0">
+            <a:spAutoFit/>
+          </a:bodyPr>
+          <a:lstStyle/>
+          <a:p>
+            <a:r>
+              <a:rPr lang="en-US" dirty="0" smtClean="0"/>
+              <a:t>1</a:t>
+            </a:r>
+            <a:endParaRPr lang="en-US" dirty="0"/>
+          </a:p>
+        </p:txBody>
+      </p:sp>
+      <p:sp>
+        <p:nvSpPr>
+          <p:cNvPr id="13" name="TextBox 12"/>
+          <p:cNvSpPr txBox="1"/>
+          <p:nvPr/>
+        </p:nvSpPr>
+        <p:spPr>
+          <a:xfrm>
+            <a:off x="235129" y="1534160"/>
+            <a:ext cx="317444" cy="369332"/>
+          </a:xfrm>
+          <a:prstGeom prst="rect">
+            <a:avLst/>
+          </a:prstGeom>
+          <a:noFill/>
+        </p:spPr>
+        <p:txBody>
+          <a:bodyPr wrap="square" rtlCol="0">
+            <a:spAutoFit/>
+          </a:bodyPr>
+          <a:lstStyle/>
+          <a:p>
+            <a:r>
+              <a:rPr lang="en-US" dirty="0" smtClean="0"/>
+              <a:t>2</a:t>
+            </a:r>
+            <a:endParaRPr lang="en-US" dirty="0"/>
+          </a:p>
+        </p:txBody>
+      </p:sp>
+      <p:sp>
+        <p:nvSpPr>
+          <p:cNvPr id="14" name="TextBox 13"/>
+          <p:cNvSpPr txBox="1"/>
+          <p:nvPr/>
+        </p:nvSpPr>
+        <p:spPr>
+          <a:xfrm>
+            <a:off x="189843" y="2150157"/>
+            <a:ext cx="306494" cy="369332"/>
+          </a:xfrm>
+          <a:prstGeom prst="rect">
+            <a:avLst/>
+          </a:prstGeom>
+          <a:noFill/>
+        </p:spPr>
+        <p:txBody>
+          <a:bodyPr wrap="none" rtlCol="0">
+            <a:spAutoFit/>
+          </a:bodyPr>
+          <a:lstStyle/>
+          <a:p>
+            <a:r>
+              <a:rPr lang="en-US" dirty="0"/>
+              <a:t>3</a:t>
+            </a:r>
+            <a:endParaRPr lang="en-US" dirty="0"/>
+          </a:p>
+        </p:txBody>
+      </p:sp>
+      <p:sp>
+        <p:nvSpPr>
+          <p:cNvPr id="15" name="TextBox 14"/>
+          <p:cNvSpPr txBox="1"/>
+          <p:nvPr/>
+        </p:nvSpPr>
+        <p:spPr>
+          <a:xfrm>
+            <a:off x="189843" y="2695480"/>
+            <a:ext cx="306494" cy="369332"/>
+          </a:xfrm>
+          <a:prstGeom prst="rect">
+            <a:avLst/>
+          </a:prstGeom>
+          <a:noFill/>
+        </p:spPr>
+        <p:txBody>
+          <a:bodyPr wrap="none" rtlCol="0">
+            <a:spAutoFit/>
+          </a:bodyPr>
+          <a:lstStyle/>
+          <a:p>
+            <a:r>
+              <a:rPr lang="en-US" dirty="0" smtClean="0"/>
+              <a:t>4</a:t>
+            </a:r>
+            <a:endParaRPr lang="en-US" dirty="0"/>
+          </a:p>
+        </p:txBody>
+      </p:sp>
+      <p:sp>
+        <p:nvSpPr>
+          <p:cNvPr id="16" name="TextBox 15"/>
+          <p:cNvSpPr txBox="1"/>
+          <p:nvPr/>
+        </p:nvSpPr>
+        <p:spPr>
+          <a:xfrm>
+            <a:off x="4069791" y="3070132"/>
+            <a:ext cx="3363421" cy="338554"/>
+          </a:xfrm>
+          <a:prstGeom prst="rect">
+            <a:avLst/>
+          </a:prstGeom>
+          <a:noFill/>
+        </p:spPr>
+        <p:txBody>
+          <a:bodyPr wrap="none" rtlCol="0">
+            <a:spAutoFit/>
+          </a:bodyPr>
+          <a:lstStyle/>
+          <a:p>
+            <a:r>
+              <a:rPr lang="ru-RU" sz="1600" dirty="0" smtClean="0">
+                <a:solidFill>
+                  <a:schemeClr val="bg1">
+                    <a:lumMod val="65000"/>
+                  </a:schemeClr>
+                </a:solidFill>
+              </a:rPr>
+              <a:t>Аналогично для</a:t>
+            </a:r>
+            <a:r>
+              <a:rPr lang="en-US" sz="1600" dirty="0" smtClean="0">
+                <a:solidFill>
+                  <a:schemeClr val="bg1">
+                    <a:lumMod val="65000"/>
+                  </a:schemeClr>
+                </a:solidFill>
+              </a:rPr>
+              <a:t> operator delete[]</a:t>
+            </a:r>
+            <a:endParaRPr lang="en-US" sz="1600" dirty="0">
+              <a:solidFill>
+                <a:schemeClr val="bg1">
+                  <a:lumMod val="65000"/>
+                </a:schemeClr>
+              </a:solidFill>
+            </a:endParaRPr>
+          </a:p>
+        </p:txBody>
+      </p:sp>
+    </p:spTree>
+    <p:extLst>
+      <p:ext uri="{BB962C8B-B14F-4D97-AF65-F5344CB8AC3E}">
+        <p14:creationId xmlns:p14="http://schemas.microsoft.com/office/powerpoint/2010/main" val="2926702704"/>
       </p:ext>
     </p:extLst>
   </p:cSld>
@@ -7065,7 +11135,7 @@
           <p:cNvPr id="4" name="Title 1">
             <a:extLst>
               <a:ext uri="{FF2B5EF4-FFF2-40B4-BE49-F238E27FC236}">
-                <a16:creationId xmlns="" xmlns:a16="http://schemas.microsoft.com/office/drawing/2014/main" id="{ECF0BCE9-3024-43A2-BA59-C2729B585737}"/>
+                <a16:creationId xmlns:a16="http://schemas.microsoft.com/office/drawing/2014/main" xmlns="" id="{ECF0BCE9-3024-43A2-BA59-C2729B585737}"/>
               </a:ext>
             </a:extLst>
           </p:cNvPr>
@@ -7099,11 +11169,7 @@
             <a:pPr algn="ctr"/>
             <a:r>
               <a:rPr lang="ru-RU" sz="2800" dirty="0" smtClean="0"/>
-              <a:t>Исключения. </a:t>
-            </a:r>
-            <a:r>
-              <a:rPr lang="ru-RU" sz="2800" dirty="0" smtClean="0"/>
-              <a:t>Завершение процесса</a:t>
+              <a:t>Исключения. Завершение процесса</a:t>
             </a:r>
             <a:endParaRPr lang="en-US" sz="2800" dirty="0"/>
           </a:p>
@@ -7962,11 +12028,7 @@
           <a:p>
             <a:r>
               <a:rPr lang="ru-RU" dirty="0" smtClean="0"/>
-              <a:t>Исключения обязательно нужно ловить, иначе программа будет </a:t>
-            </a:r>
-            <a:r>
-              <a:rPr lang="ru-RU" dirty="0" smtClean="0"/>
-              <a:t>завершена</a:t>
+              <a:t>Исключения обязательно нужно ловить, иначе программа будет завершена</a:t>
             </a:r>
             <a:r>
               <a:rPr lang="en-US" dirty="0" smtClean="0"/>
@@ -7982,11 +12044,7 @@
             </a:r>
             <a:r>
               <a:rPr lang="ru-RU" dirty="0" smtClean="0"/>
-              <a:t>который, в свою очередь, вызовет </a:t>
-            </a:r>
-            <a:r>
-              <a:rPr lang="ru-RU" dirty="0" smtClean="0"/>
-              <a:t>системный вызов </a:t>
+              <a:t>который, в свою очередь, вызовет системный вызов </a:t>
             </a:r>
             <a:r>
               <a:rPr lang="en-US" dirty="0" smtClean="0"/>
@@ -8007,7 +12065,7 @@
           <p:cNvPr id="4" name="Title 1">
             <a:extLst>
               <a:ext uri="{FF2B5EF4-FFF2-40B4-BE49-F238E27FC236}">
-                <a16:creationId xmlns="" xmlns:a16="http://schemas.microsoft.com/office/drawing/2014/main" id="{ECF0BCE9-3024-43A2-BA59-C2729B585737}"/>
+                <a16:creationId xmlns:a16="http://schemas.microsoft.com/office/drawing/2014/main" xmlns="" id="{ECF0BCE9-3024-43A2-BA59-C2729B585737}"/>
               </a:ext>
             </a:extLst>
           </p:cNvPr>
@@ -8194,7 +12252,7 @@
           <p:cNvPr id="4" name="Title 1">
             <a:extLst>
               <a:ext uri="{FF2B5EF4-FFF2-40B4-BE49-F238E27FC236}">
-                <a16:creationId xmlns="" xmlns:a16="http://schemas.microsoft.com/office/drawing/2014/main" id="{ECF0BCE9-3024-43A2-BA59-C2729B585737}"/>
+                <a16:creationId xmlns:a16="http://schemas.microsoft.com/office/drawing/2014/main" xmlns="" id="{ECF0BCE9-3024-43A2-BA59-C2729B585737}"/>
               </a:ext>
             </a:extLst>
           </p:cNvPr>
@@ -10842,7 +14900,7 @@
           <p:cNvPr id="4" name="Title 1">
             <a:extLst>
               <a:ext uri="{FF2B5EF4-FFF2-40B4-BE49-F238E27FC236}">
-                <a16:creationId xmlns="" xmlns:a16="http://schemas.microsoft.com/office/drawing/2014/main" id="{ECF0BCE9-3024-43A2-BA59-C2729B585737}"/>
+                <a16:creationId xmlns:a16="http://schemas.microsoft.com/office/drawing/2014/main" xmlns="" id="{ECF0BCE9-3024-43A2-BA59-C2729B585737}"/>
               </a:ext>
             </a:extLst>
           </p:cNvPr>
@@ -11471,7 +15529,7 @@
           <p:cNvPr id="5" name="Title 1">
             <a:extLst>
               <a:ext uri="{FF2B5EF4-FFF2-40B4-BE49-F238E27FC236}">
-                <a16:creationId xmlns="" xmlns:a16="http://schemas.microsoft.com/office/drawing/2014/main" id="{ECF0BCE9-3024-43A2-BA59-C2729B585737}"/>
+                <a16:creationId xmlns:a16="http://schemas.microsoft.com/office/drawing/2014/main" xmlns="" id="{ECF0BCE9-3024-43A2-BA59-C2729B585737}"/>
               </a:ext>
             </a:extLst>
           </p:cNvPr>
@@ -11950,7 +16008,7 @@
           <p:cNvPr id="5" name="Title 1">
             <a:extLst>
               <a:ext uri="{FF2B5EF4-FFF2-40B4-BE49-F238E27FC236}">
-                <a16:creationId xmlns="" xmlns:a16="http://schemas.microsoft.com/office/drawing/2014/main" id="{ECF0BCE9-3024-43A2-BA59-C2729B585737}"/>
+                <a16:creationId xmlns:a16="http://schemas.microsoft.com/office/drawing/2014/main" xmlns="" id="{ECF0BCE9-3024-43A2-BA59-C2729B585737}"/>
               </a:ext>
             </a:extLst>
           </p:cNvPr>
@@ -11984,11 +16042,7 @@
             <a:pPr algn="ctr"/>
             <a:r>
               <a:rPr lang="ru-RU" sz="2800" dirty="0" smtClean="0"/>
-              <a:t>Исключения. </a:t>
-            </a:r>
-            <a:r>
-              <a:rPr lang="ru-RU" sz="2800" dirty="0" smtClean="0"/>
-              <a:t>Повторный «выброс» исключения</a:t>
+              <a:t>Исключения. Повторный «выброс» исключения</a:t>
             </a:r>
             <a:endParaRPr lang="en-US" sz="2800" dirty="0"/>
           </a:p>
@@ -12220,7 +16274,7 @@
           <p:cNvPr id="4" name="Title 1">
             <a:extLst>
               <a:ext uri="{FF2B5EF4-FFF2-40B4-BE49-F238E27FC236}">
-                <a16:creationId xmlns="" xmlns:a16="http://schemas.microsoft.com/office/drawing/2014/main" id="{ECF0BCE9-3024-43A2-BA59-C2729B585737}"/>
+                <a16:creationId xmlns:a16="http://schemas.microsoft.com/office/drawing/2014/main" xmlns="" id="{ECF0BCE9-3024-43A2-BA59-C2729B585737}"/>
               </a:ext>
             </a:extLst>
           </p:cNvPr>
@@ -12254,11 +16308,7 @@
             <a:pPr algn="ctr"/>
             <a:r>
               <a:rPr lang="ru-RU" sz="2800" dirty="0" smtClean="0"/>
-              <a:t>Исключения. </a:t>
-            </a:r>
-            <a:r>
-              <a:rPr lang="ru-RU" sz="2800" dirty="0" smtClean="0"/>
-              <a:t>Ограничения</a:t>
+              <a:t>Исключения. Ограничения</a:t>
             </a:r>
             <a:endParaRPr lang="en-US" sz="2800" dirty="0"/>
           </a:p>
@@ -12575,7 +16625,7 @@
           <p:cNvPr id="4" name="Title 1">
             <a:extLst>
               <a:ext uri="{FF2B5EF4-FFF2-40B4-BE49-F238E27FC236}">
-                <a16:creationId xmlns="" xmlns:a16="http://schemas.microsoft.com/office/drawing/2014/main" id="{ECF0BCE9-3024-43A2-BA59-C2729B585737}"/>
+                <a16:creationId xmlns:a16="http://schemas.microsoft.com/office/drawing/2014/main" xmlns="" id="{ECF0BCE9-3024-43A2-BA59-C2729B585737}"/>
               </a:ext>
             </a:extLst>
           </p:cNvPr>
@@ -12609,11 +16659,7 @@
             <a:pPr algn="ctr"/>
             <a:r>
               <a:rPr lang="ru-RU" sz="2800" dirty="0" smtClean="0"/>
-              <a:t>Исключения. </a:t>
-            </a:r>
-            <a:r>
-              <a:rPr lang="ru-RU" sz="2800" dirty="0" smtClean="0"/>
-              <a:t>Как надо и как не надо</a:t>
+              <a:t>Исключения. Как надо и как не надо</a:t>
             </a:r>
             <a:endParaRPr lang="en-US" sz="2800" dirty="0"/>
           </a:p>

</xml_diff>